<commit_message>
change formatting, update hw numbers
</commit_message>
<xml_diff>
--- a/notes/L21/Lsn21.pptx
+++ b/notes/L21/Lsn21.pptx
@@ -4324,7 +4324,11 @@
           <a:p>
             <a:r>
               <a:rPr lang="en-US" b="1" dirty="0" smtClean="0"/>
-              <a:t>Assignment 6</a:t>
+              <a:t>Assignment </a:t>
+            </a:r>
+            <a:r>
+              <a:rPr lang="en-US" b="1" dirty="0" smtClean="0"/>
+              <a:t>8</a:t>
             </a:r>
             <a:endParaRPr lang="en-US" dirty="0"/>
           </a:p>
@@ -4353,47 +4357,86 @@
             <a:pPr marL="400050" lvl="1" indent="0">
               <a:buNone/>
             </a:pPr>
-            <a:r>
-              <a:rPr lang="en-US" sz="1400" b="1" dirty="0" smtClean="0">
-                <a:solidFill>
-                  <a:schemeClr val="accent2"/>
-                </a:solidFill>
-                <a:latin typeface="Courier New" pitchFamily="49" charset="0"/>
-                <a:cs typeface="Courier New" pitchFamily="49" charset="0"/>
-              </a:rPr>
-              <a:t>Try Assignment 7:     </a:t>
+            <a:endParaRPr lang="en-US" dirty="0" smtClean="0"/>
+          </a:p>
+          <a:p>
+            <a:pPr marL="400050" lvl="1" indent="0">
+              <a:buNone/>
+            </a:pPr>
+            <a:r>
+              <a:rPr lang="en-US" dirty="0" smtClean="0"/>
+              <a:t>Assignment 8 - </a:t>
+            </a:r>
+            <a:r>
+              <a:rPr lang="en-US" dirty="0" smtClean="0"/>
+              <a:t>Moving </a:t>
+            </a:r>
+            <a:r>
+              <a:rPr lang="en-US" dirty="0" smtClean="0"/>
+              <a:t>Average</a:t>
             </a:r>
           </a:p>
           <a:p>
             <a:pPr marL="0" indent="0">
               <a:buNone/>
             </a:pPr>
-            <a:r>
-              <a:rPr lang="en-US" sz="1400" b="1" dirty="0">
-                <a:solidFill>
-                  <a:schemeClr val="accent2"/>
-                </a:solidFill>
-                <a:latin typeface="Courier New" pitchFamily="49" charset="0"/>
-                <a:cs typeface="Courier New" pitchFamily="49" charset="0"/>
-              </a:rPr>
-              <a:t>          </a:t>
-            </a:r>
-            <a:r>
-              <a:rPr lang="en-US" dirty="0">
-                <a:hlinkClick r:id="rId2"/>
-              </a:rPr>
-              <a:t>Assignment </a:t>
-            </a:r>
-            <a:r>
-              <a:rPr lang="en-US" dirty="0" smtClean="0">
-                <a:hlinkClick r:id="rId2"/>
-              </a:rPr>
-              <a:t>7</a:t>
-            </a:r>
-            <a:r>
-              <a:rPr lang="en-US" dirty="0" smtClean="0"/>
-              <a:t>- Moving Average</a:t>
-            </a:r>
+            <a:endParaRPr lang="en-US" sz="1400" b="1" dirty="0">
+              <a:solidFill>
+                <a:schemeClr val="accent2"/>
+              </a:solidFill>
+              <a:latin typeface="Courier New" pitchFamily="49" charset="0"/>
+              <a:cs typeface="Courier New" pitchFamily="49" charset="0"/>
+            </a:endParaRPr>
+          </a:p>
+          <a:p>
+            <a:r>
+              <a:rPr lang="en-US" sz="1400" dirty="0" smtClean="0"/>
+              <a:t>Write </a:t>
+            </a:r>
+            <a:r>
+              <a:rPr lang="en-US" sz="1400" dirty="0"/>
+              <a:t>a function that computes the "moving average" for a stream of data points it is receiving</a:t>
+            </a:r>
+            <a:r>
+              <a:rPr lang="en-US" sz="1400" dirty="0" smtClean="0"/>
+              <a:t>.</a:t>
+            </a:r>
+          </a:p>
+          <a:p>
+            <a:r>
+              <a:rPr lang="en-US" sz="1400" dirty="0"/>
+              <a:t>Write two other functions that compute the maximum and minimum values in a given array. You can "terminate" (last element is some predefined constant to simplify your loop) or pass in the length of the array as a parameter.</a:t>
+            </a:r>
+          </a:p>
+          <a:p>
+            <a:r>
+              <a:rPr lang="en-US" sz="1400" dirty="0"/>
+              <a:t>Write another function that computes the range of values in an array</a:t>
+            </a:r>
+            <a:r>
+              <a:rPr lang="en-US" sz="1400" dirty="0" smtClean="0"/>
+              <a:t>.\</a:t>
+            </a:r>
+          </a:p>
+          <a:p>
+            <a:r>
+              <a:rPr lang="en-US" sz="1400" dirty="0" smtClean="0"/>
+              <a:t>Three separate files: </a:t>
+            </a:r>
+            <a:r>
+              <a:rPr lang="en-US" sz="1400" dirty="0" err="1" smtClean="0"/>
+              <a:t>main.c</a:t>
+            </a:r>
+            <a:r>
+              <a:rPr lang="en-US" sz="1400" dirty="0" smtClean="0"/>
+              <a:t>, header, implementation </a:t>
+            </a:r>
+            <a:endParaRPr lang="en-US" sz="1400" dirty="0"/>
+          </a:p>
+          <a:p>
+            <a:pPr marL="0" indent="0">
+              <a:buNone/>
+            </a:pPr>
             <a:endParaRPr lang="en-US" sz="1400" b="1" dirty="0" smtClean="0">
               <a:solidFill>
                 <a:schemeClr val="accent2"/>
@@ -7504,14 +7547,14 @@
               <a:t>unsigned </a:t>
             </a:r>
             <a:r>
-              <a:rPr lang="en-US" sz="1400" b="1" dirty="0" err="1" smtClean="0">
-                <a:solidFill>
-                  <a:schemeClr val="accent2"/>
-                </a:solidFill>
-                <a:latin typeface="Courier New" pitchFamily="49" charset="0"/>
-                <a:cs typeface="Courier New" pitchFamily="49" charset="0"/>
-              </a:rPr>
-              <a:t>int</a:t>
+              <a:rPr lang="en-US" sz="1400" b="1" dirty="0" smtClean="0">
+                <a:solidFill>
+                  <a:schemeClr val="accent2"/>
+                </a:solidFill>
+                <a:latin typeface="Courier New" pitchFamily="49" charset="0"/>
+                <a:cs typeface="Courier New" pitchFamily="49" charset="0"/>
+              </a:rPr>
+              <a:t>char</a:t>
             </a:r>
             <a:r>
               <a:rPr lang="en-US" sz="1400" b="1" dirty="0" smtClean="0">

</xml_diff>

<commit_message>
Updating Lesson 21 slides.
</commit_message>
<xml_diff>
--- a/notes/L21/Lsn21.pptx
+++ b/notes/L21/Lsn21.pptx
@@ -24,7 +24,7 @@
     <p:sldId id="437" r:id="rId12"/>
   </p:sldIdLst>
   <p:sldSz cx="9144000" cy="6858000" type="screen4x3"/>
-  <p:notesSz cx="7010400" cy="9296400"/>
+  <p:notesSz cx="7315200" cy="9601200"/>
   <p:defaultTextStyle>
     <a:defPPr>
       <a:defRPr lang="en-US"/>
@@ -200,7 +200,7 @@
         <p:spPr bwMode="auto">
           <a:xfrm>
             <a:off x="1" y="0"/>
-            <a:ext cx="3037628" cy="464184"/>
+            <a:ext cx="3169699" cy="479403"/>
           </a:xfrm>
           <a:prstGeom prst="rect">
             <a:avLst/>
@@ -215,13 +215,13 @@
           <a:effectLst/>
         </p:spPr>
         <p:txBody>
-          <a:bodyPr vert="horz" wrap="square" lIns="93245" tIns="46623" rIns="93245" bIns="46623" numCol="1" anchor="t" anchorCtr="0" compatLnSpc="1">
+          <a:bodyPr vert="horz" wrap="square" lIns="96723" tIns="48362" rIns="96723" bIns="48362" numCol="1" anchor="t" anchorCtr="0" compatLnSpc="1">
             <a:prstTxWarp prst="textNoShape">
               <a:avLst/>
             </a:prstTxWarp>
           </a:bodyPr>
           <a:lstStyle>
-            <a:lvl1pPr defTabSz="932415">
+            <a:lvl1pPr defTabSz="967194">
               <a:spcBef>
                 <a:spcPct val="0"/>
               </a:spcBef>
@@ -248,8 +248,8 @@
         </p:nvSpPr>
         <p:spPr bwMode="auto">
           <a:xfrm>
-            <a:off x="3972772" y="0"/>
-            <a:ext cx="3037628" cy="464184"/>
+            <a:off x="4145501" y="0"/>
+            <a:ext cx="3169699" cy="479403"/>
           </a:xfrm>
           <a:prstGeom prst="rect">
             <a:avLst/>
@@ -264,13 +264,13 @@
           <a:effectLst/>
         </p:spPr>
         <p:txBody>
-          <a:bodyPr vert="horz" wrap="square" lIns="93245" tIns="46623" rIns="93245" bIns="46623" numCol="1" anchor="t" anchorCtr="0" compatLnSpc="1">
+          <a:bodyPr vert="horz" wrap="square" lIns="96723" tIns="48362" rIns="96723" bIns="48362" numCol="1" anchor="t" anchorCtr="0" compatLnSpc="1">
             <a:prstTxWarp prst="textNoShape">
               <a:avLst/>
             </a:prstTxWarp>
           </a:bodyPr>
           <a:lstStyle>
-            <a:lvl1pPr algn="r" defTabSz="932415">
+            <a:lvl1pPr algn="r" defTabSz="967194">
               <a:spcBef>
                 <a:spcPct val="0"/>
               </a:spcBef>
@@ -297,8 +297,8 @@
         </p:nvSpPr>
         <p:spPr bwMode="auto">
           <a:xfrm>
-            <a:off x="1" y="8832216"/>
-            <a:ext cx="3037628" cy="464184"/>
+            <a:off x="1" y="9121797"/>
+            <a:ext cx="3169699" cy="479403"/>
           </a:xfrm>
           <a:prstGeom prst="rect">
             <a:avLst/>
@@ -313,13 +313,13 @@
           <a:effectLst/>
         </p:spPr>
         <p:txBody>
-          <a:bodyPr vert="horz" wrap="square" lIns="93245" tIns="46623" rIns="93245" bIns="46623" numCol="1" anchor="b" anchorCtr="0" compatLnSpc="1">
+          <a:bodyPr vert="horz" wrap="square" lIns="96723" tIns="48362" rIns="96723" bIns="48362" numCol="1" anchor="b" anchorCtr="0" compatLnSpc="1">
             <a:prstTxWarp prst="textNoShape">
               <a:avLst/>
             </a:prstTxWarp>
           </a:bodyPr>
           <a:lstStyle>
-            <a:lvl1pPr defTabSz="932415">
+            <a:lvl1pPr defTabSz="967194">
               <a:spcBef>
                 <a:spcPct val="0"/>
               </a:spcBef>
@@ -346,8 +346,8 @@
         </p:nvSpPr>
         <p:spPr bwMode="auto">
           <a:xfrm>
-            <a:off x="3972772" y="8832216"/>
-            <a:ext cx="3037628" cy="464184"/>
+            <a:off x="4145501" y="9121797"/>
+            <a:ext cx="3169699" cy="479403"/>
           </a:xfrm>
           <a:prstGeom prst="rect">
             <a:avLst/>
@@ -362,13 +362,13 @@
           <a:effectLst/>
         </p:spPr>
         <p:txBody>
-          <a:bodyPr vert="horz" wrap="square" lIns="93245" tIns="46623" rIns="93245" bIns="46623" numCol="1" anchor="b" anchorCtr="0" compatLnSpc="1">
+          <a:bodyPr vert="horz" wrap="square" lIns="96723" tIns="48362" rIns="96723" bIns="48362" numCol="1" anchor="b" anchorCtr="0" compatLnSpc="1">
             <a:prstTxWarp prst="textNoShape">
               <a:avLst/>
             </a:prstTxWarp>
           </a:bodyPr>
           <a:lstStyle>
-            <a:lvl1pPr algn="r" defTabSz="932415">
+            <a:lvl1pPr algn="r" defTabSz="967194">
               <a:spcBef>
                 <a:spcPct val="0"/>
               </a:spcBef>
@@ -439,7 +439,7 @@
         <p:spPr bwMode="auto">
           <a:xfrm>
             <a:off x="1" y="0"/>
-            <a:ext cx="3037628" cy="464184"/>
+            <a:ext cx="3169699" cy="479403"/>
           </a:xfrm>
           <a:prstGeom prst="rect">
             <a:avLst/>
@@ -454,13 +454,13 @@
           <a:effectLst/>
         </p:spPr>
         <p:txBody>
-          <a:bodyPr vert="horz" wrap="square" lIns="93245" tIns="46623" rIns="93245" bIns="46623" numCol="1" anchor="t" anchorCtr="0" compatLnSpc="1">
+          <a:bodyPr vert="horz" wrap="square" lIns="96723" tIns="48362" rIns="96723" bIns="48362" numCol="1" anchor="t" anchorCtr="0" compatLnSpc="1">
             <a:prstTxWarp prst="textNoShape">
               <a:avLst/>
             </a:prstTxWarp>
           </a:bodyPr>
           <a:lstStyle>
-            <a:lvl1pPr defTabSz="932415">
+            <a:lvl1pPr defTabSz="967194">
               <a:spcBef>
                 <a:spcPct val="0"/>
               </a:spcBef>
@@ -487,8 +487,8 @@
         </p:nvSpPr>
         <p:spPr bwMode="auto">
           <a:xfrm>
-            <a:off x="3972772" y="0"/>
-            <a:ext cx="3037628" cy="464184"/>
+            <a:off x="4145501" y="0"/>
+            <a:ext cx="3169699" cy="479403"/>
           </a:xfrm>
           <a:prstGeom prst="rect">
             <a:avLst/>
@@ -503,13 +503,13 @@
           <a:effectLst/>
         </p:spPr>
         <p:txBody>
-          <a:bodyPr vert="horz" wrap="square" lIns="93245" tIns="46623" rIns="93245" bIns="46623" numCol="1" anchor="t" anchorCtr="0" compatLnSpc="1">
+          <a:bodyPr vert="horz" wrap="square" lIns="96723" tIns="48362" rIns="96723" bIns="48362" numCol="1" anchor="t" anchorCtr="0" compatLnSpc="1">
             <a:prstTxWarp prst="textNoShape">
               <a:avLst/>
             </a:prstTxWarp>
           </a:bodyPr>
           <a:lstStyle>
-            <a:lvl1pPr algn="r" defTabSz="932415">
+            <a:lvl1pPr algn="r" defTabSz="967194">
               <a:spcBef>
                 <a:spcPct val="0"/>
               </a:spcBef>
@@ -536,8 +536,8 @@
         </p:nvSpPr>
         <p:spPr bwMode="auto">
           <a:xfrm>
-            <a:off x="1181100" y="698500"/>
-            <a:ext cx="4648200" cy="3486150"/>
+            <a:off x="1257300" y="720725"/>
+            <a:ext cx="4800600" cy="3600450"/>
           </a:xfrm>
           <a:prstGeom prst="rect">
             <a:avLst/>
@@ -565,8 +565,8 @@
         </p:nvSpPr>
         <p:spPr bwMode="auto">
           <a:xfrm>
-            <a:off x="935144" y="4416109"/>
-            <a:ext cx="5140112" cy="4182427"/>
+            <a:off x="975803" y="4560900"/>
+            <a:ext cx="5363595" cy="4319556"/>
           </a:xfrm>
           <a:prstGeom prst="rect">
             <a:avLst/>
@@ -581,7 +581,7 @@
           <a:effectLst/>
         </p:spPr>
         <p:txBody>
-          <a:bodyPr vert="horz" wrap="square" lIns="93245" tIns="46623" rIns="93245" bIns="46623" numCol="1" anchor="t" anchorCtr="0" compatLnSpc="1">
+          <a:bodyPr vert="horz" wrap="square" lIns="96723" tIns="48362" rIns="96723" bIns="48362" numCol="1" anchor="t" anchorCtr="0" compatLnSpc="1">
             <a:prstTxWarp prst="textNoShape">
               <a:avLst/>
             </a:prstTxWarp>
@@ -636,8 +636,8 @@
         </p:nvSpPr>
         <p:spPr bwMode="auto">
           <a:xfrm>
-            <a:off x="1" y="8832216"/>
-            <a:ext cx="3037628" cy="464184"/>
+            <a:off x="1" y="9121797"/>
+            <a:ext cx="3169699" cy="479403"/>
           </a:xfrm>
           <a:prstGeom prst="rect">
             <a:avLst/>
@@ -652,13 +652,13 @@
           <a:effectLst/>
         </p:spPr>
         <p:txBody>
-          <a:bodyPr vert="horz" wrap="square" lIns="93245" tIns="46623" rIns="93245" bIns="46623" numCol="1" anchor="b" anchorCtr="0" compatLnSpc="1">
+          <a:bodyPr vert="horz" wrap="square" lIns="96723" tIns="48362" rIns="96723" bIns="48362" numCol="1" anchor="b" anchorCtr="0" compatLnSpc="1">
             <a:prstTxWarp prst="textNoShape">
               <a:avLst/>
             </a:prstTxWarp>
           </a:bodyPr>
           <a:lstStyle>
-            <a:lvl1pPr defTabSz="932415">
+            <a:lvl1pPr defTabSz="967194">
               <a:spcBef>
                 <a:spcPct val="0"/>
               </a:spcBef>
@@ -685,8 +685,8 @@
         </p:nvSpPr>
         <p:spPr bwMode="auto">
           <a:xfrm>
-            <a:off x="3972772" y="8832216"/>
-            <a:ext cx="3037628" cy="464184"/>
+            <a:off x="4145501" y="9121797"/>
+            <a:ext cx="3169699" cy="479403"/>
           </a:xfrm>
           <a:prstGeom prst="rect">
             <a:avLst/>
@@ -701,13 +701,13 @@
           <a:effectLst/>
         </p:spPr>
         <p:txBody>
-          <a:bodyPr vert="horz" wrap="square" lIns="93245" tIns="46623" rIns="93245" bIns="46623" numCol="1" anchor="b" anchorCtr="0" compatLnSpc="1">
+          <a:bodyPr vert="horz" wrap="square" lIns="96723" tIns="48362" rIns="96723" bIns="48362" numCol="1" anchor="b" anchorCtr="0" compatLnSpc="1">
             <a:prstTxWarp prst="textNoShape">
               <a:avLst/>
             </a:prstTxWarp>
           </a:bodyPr>
           <a:lstStyle>
-            <a:lvl1pPr algn="r" defTabSz="932415">
+            <a:lvl1pPr algn="r" defTabSz="967194">
               <a:spcBef>
                 <a:spcPct val="0"/>
               </a:spcBef>
@@ -3937,11 +3937,6 @@
               </a:rPr>
               <a:t>today</a:t>
             </a:r>
-            <a:endParaRPr lang="en-US" sz="2000" dirty="0" smtClean="0">
-              <a:solidFill>
-                <a:srgbClr val="0070C0"/>
-              </a:solidFill>
-            </a:endParaRPr>
           </a:p>
           <a:p>
             <a:pPr lvl="1" algn="l"/>
@@ -3951,15 +3946,7 @@
                   <a:srgbClr val="0070C0"/>
                 </a:solidFill>
               </a:rPr>
-              <a:t>Assignment 8 </a:t>
-            </a:r>
-            <a:r>
-              <a:rPr lang="en-US" sz="2000" dirty="0" smtClean="0">
-                <a:solidFill>
-                  <a:srgbClr val="0070C0"/>
-                </a:solidFill>
-              </a:rPr>
-              <a:t>due BOC next Lesson</a:t>
+              <a:t>Assignment 8 due BOC next Lesson</a:t>
             </a:r>
           </a:p>
           <a:p>
@@ -4324,11 +4311,7 @@
           <a:p>
             <a:r>
               <a:rPr lang="en-US" b="1" dirty="0" smtClean="0"/>
-              <a:t>Assignment </a:t>
-            </a:r>
-            <a:r>
-              <a:rPr lang="en-US" b="1" dirty="0" smtClean="0"/>
-              <a:t>8</a:t>
+              <a:t>Assignment 8</a:t>
             </a:r>
             <a:endParaRPr lang="en-US" dirty="0"/>
           </a:p>
@@ -4365,15 +4348,7 @@
             </a:pPr>
             <a:r>
               <a:rPr lang="en-US" dirty="0" smtClean="0"/>
-              <a:t>Assignment 8 - </a:t>
-            </a:r>
-            <a:r>
-              <a:rPr lang="en-US" dirty="0" smtClean="0"/>
-              <a:t>Moving </a:t>
-            </a:r>
-            <a:r>
-              <a:rPr lang="en-US" dirty="0" smtClean="0"/>
-              <a:t>Average</a:t>
+              <a:t>Assignment 8 - Moving Average</a:t>
             </a:r>
           </a:p>
           <a:p>
@@ -4772,6 +4747,16 @@
               <a:buNone/>
             </a:pPr>
             <a:r>
+              <a:rPr lang="en-US" sz="1400" b="1" dirty="0" err="1" smtClean="0">
+                <a:solidFill>
+                  <a:schemeClr val="accent2"/>
+                </a:solidFill>
+                <a:latin typeface="Courier New" pitchFamily="49" charset="0"/>
+                <a:cs typeface="Courier New" pitchFamily="49" charset="0"/>
+              </a:rPr>
+              <a:t>int</a:t>
+            </a:r>
+            <a:r>
               <a:rPr lang="en-US" sz="1400" b="1" dirty="0" smtClean="0">
                 <a:solidFill>
                   <a:schemeClr val="accent2"/>
@@ -4779,7 +4764,7 @@
                 <a:latin typeface="Courier New" pitchFamily="49" charset="0"/>
                 <a:cs typeface="Courier New" pitchFamily="49" charset="0"/>
               </a:rPr>
-              <a:t>int * </a:t>
+              <a:t> *</a:t>
             </a:r>
             <a:r>
               <a:rPr lang="en-US" sz="1400" b="1" dirty="0" err="1" smtClean="0">
@@ -4998,70 +4983,43 @@
                 <a:latin typeface="Courier New" pitchFamily="49" charset="0"/>
                 <a:cs typeface="Courier New" pitchFamily="49" charset="0"/>
               </a:rPr>
-              <a:t> = </a:t>
+              <a:t> = 0x2006; </a:t>
             </a:r>
             <a:r>
               <a:rPr lang="en-US" sz="1400" b="1" dirty="0" smtClean="0">
                 <a:solidFill>
-                  <a:schemeClr val="accent2"/>
-                </a:solidFill>
-                <a:latin typeface="Courier New" pitchFamily="49" charset="0"/>
-                <a:cs typeface="Courier New" pitchFamily="49" charset="0"/>
-              </a:rPr>
-              <a:t>0x2006; </a:t>
+                  <a:srgbClr val="00B050"/>
+                </a:solidFill>
+                <a:latin typeface="Courier New" pitchFamily="49" charset="0"/>
+                <a:cs typeface="Courier New" pitchFamily="49" charset="0"/>
+              </a:rPr>
+              <a:t>//what is x?</a:t>
+            </a:r>
+          </a:p>
+          <a:p>
+            <a:pPr marL="0" indent="0">
+              <a:buNone/>
+            </a:pPr>
+            <a:r>
+              <a:rPr lang="en-US" sz="1400" b="1" dirty="0" err="1" smtClean="0">
+                <a:solidFill>
+                  <a:schemeClr val="accent2"/>
+                </a:solidFill>
+                <a:latin typeface="Courier New" pitchFamily="49" charset="0"/>
+                <a:cs typeface="Courier New" pitchFamily="49" charset="0"/>
+              </a:rPr>
+              <a:t>xPtr</a:t>
             </a:r>
             <a:r>
               <a:rPr lang="en-US" sz="1400" b="1" dirty="0" smtClean="0">
                 <a:solidFill>
-                  <a:srgbClr val="00B050"/>
-                </a:solidFill>
-                <a:latin typeface="Courier New" pitchFamily="49" charset="0"/>
-                <a:cs typeface="Courier New" pitchFamily="49" charset="0"/>
-              </a:rPr>
-              <a:t>//what is x?</a:t>
-            </a:r>
-          </a:p>
-          <a:p>
-            <a:pPr marL="0" indent="0">
-              <a:buNone/>
-            </a:pPr>
-            <a:r>
-              <a:rPr lang="en-US" sz="1400" b="1" dirty="0" err="1" smtClean="0">
-                <a:solidFill>
-                  <a:schemeClr val="accent2"/>
-                </a:solidFill>
-                <a:latin typeface="Courier New" pitchFamily="49" charset="0"/>
-                <a:cs typeface="Courier New" pitchFamily="49" charset="0"/>
-              </a:rPr>
-              <a:t>xPtr</a:t>
-            </a:r>
-            <a:r>
-              <a:rPr lang="en-US" sz="1400" b="1" dirty="0" smtClean="0">
-                <a:solidFill>
-                  <a:schemeClr val="accent2"/>
-                </a:solidFill>
-                <a:latin typeface="Courier New" pitchFamily="49" charset="0"/>
-                <a:cs typeface="Courier New" pitchFamily="49" charset="0"/>
-              </a:rPr>
-              <a:t> = </a:t>
-            </a:r>
-            <a:r>
-              <a:rPr lang="en-US" sz="1400" b="1" dirty="0" smtClean="0">
-                <a:solidFill>
-                  <a:schemeClr val="accent2"/>
-                </a:solidFill>
-                <a:latin typeface="Courier New" pitchFamily="49" charset="0"/>
-                <a:cs typeface="Courier New" pitchFamily="49" charset="0"/>
-              </a:rPr>
-              <a:t>0x2006; </a:t>
-            </a:r>
-            <a:endParaRPr lang="en-US" sz="1400" b="1" dirty="0" smtClean="0">
-              <a:solidFill>
-                <a:schemeClr val="accent2"/>
-              </a:solidFill>
-              <a:latin typeface="Courier New" pitchFamily="49" charset="0"/>
-              <a:cs typeface="Courier New" pitchFamily="49" charset="0"/>
-            </a:endParaRPr>
+                  <a:schemeClr val="accent2"/>
+                </a:solidFill>
+                <a:latin typeface="Courier New" pitchFamily="49" charset="0"/>
+                <a:cs typeface="Courier New" pitchFamily="49" charset="0"/>
+              </a:rPr>
+              <a:t> = 0x2006; </a:t>
+            </a:r>
           </a:p>
           <a:p>
             <a:pPr marL="0" indent="0">
@@ -6012,7 +5970,7 @@
           <p:nvPr>
             <p:extLst>
               <p:ext uri="{D42A27DB-BD31-4B8C-83A1-F6EECF244321}">
-                <p14:modId xmlns:p14="http://schemas.microsoft.com/office/powerpoint/2010/main" val="318970807"/>
+                <p14:modId xmlns:p14="http://schemas.microsoft.com/office/powerpoint/2010/main" val="2386029260"/>
               </p:ext>
             </p:extLst>
           </p:nvPr>
@@ -6025,7 +5983,7 @@
           <a:graphicData uri="http://schemas.openxmlformats.org/drawingml/2006/table">
             <a:tbl>
               <a:tblPr firstRow="1" bandRow="1">
-                <a:tableStyleId>{5C22544A-7EE6-4342-B048-85BDC9FD1C3A}</a:tableStyleId>
+                <a:tableStyleId>{21E4AEA4-8DFA-4A89-87EB-49C32662AFE0}</a:tableStyleId>
               </a:tblPr>
               <a:tblGrid>
                 <a:gridCol w="1016000"/>
@@ -6204,7 +6162,7 @@
           <p:nvPr>
             <p:extLst>
               <p:ext uri="{D42A27DB-BD31-4B8C-83A1-F6EECF244321}">
-                <p14:modId xmlns:p14="http://schemas.microsoft.com/office/powerpoint/2010/main" val="1677532103"/>
+                <p14:modId xmlns:p14="http://schemas.microsoft.com/office/powerpoint/2010/main" val="186399351"/>
               </p:ext>
             </p:extLst>
           </p:nvPr>
@@ -6217,7 +6175,7 @@
           <a:graphicData uri="http://schemas.openxmlformats.org/drawingml/2006/table">
             <a:tbl>
               <a:tblPr firstRow="1" bandRow="1">
-                <a:tableStyleId>{5C22544A-7EE6-4342-B048-85BDC9FD1C3A}</a:tableStyleId>
+                <a:tableStyleId>{21E4AEA4-8DFA-4A89-87EB-49C32662AFE0}</a:tableStyleId>
               </a:tblPr>
               <a:tblGrid>
                 <a:gridCol w="1003414"/>
@@ -7544,27 +7502,7 @@
                 <a:latin typeface="Courier New" pitchFamily="49" charset="0"/>
                 <a:cs typeface="Courier New" pitchFamily="49" charset="0"/>
               </a:rPr>
-              <a:t>unsigned </a:t>
-            </a:r>
-            <a:r>
-              <a:rPr lang="en-US" sz="1400" b="1" dirty="0" smtClean="0">
-                <a:solidFill>
-                  <a:schemeClr val="accent2"/>
-                </a:solidFill>
-                <a:latin typeface="Courier New" pitchFamily="49" charset="0"/>
-                <a:cs typeface="Courier New" pitchFamily="49" charset="0"/>
-              </a:rPr>
-              <a:t>char</a:t>
-            </a:r>
-            <a:r>
-              <a:rPr lang="en-US" sz="1400" b="1" dirty="0" smtClean="0">
-                <a:solidFill>
-                  <a:schemeClr val="accent2"/>
-                </a:solidFill>
-                <a:latin typeface="Courier New" pitchFamily="49" charset="0"/>
-                <a:cs typeface="Courier New" pitchFamily="49" charset="0"/>
-              </a:rPr>
-              <a:t>* </a:t>
+              <a:t>unsigned char* </a:t>
             </a:r>
             <a:r>
               <a:rPr lang="en-US" sz="1400" b="1" dirty="0" err="1" smtClean="0">
@@ -7635,89 +7573,72 @@
                 <a:latin typeface="Courier New" pitchFamily="49" charset="0"/>
                 <a:cs typeface="Courier New" pitchFamily="49" charset="0"/>
               </a:rPr>
-              <a:t>Examples</a:t>
-            </a:r>
+              <a:t>Examples: </a:t>
+            </a:r>
+            <a:r>
+              <a:rPr lang="en-US" sz="1400" b="1" dirty="0" smtClean="0">
+                <a:solidFill>
+                  <a:srgbClr val="00B050"/>
+                </a:solidFill>
+                <a:latin typeface="Courier New" pitchFamily="49" charset="0"/>
+                <a:cs typeface="Courier New" pitchFamily="49" charset="0"/>
+              </a:rPr>
+              <a:t>// </a:t>
+            </a:r>
+            <a:r>
+              <a:rPr lang="en-US" sz="1400" b="1" dirty="0" smtClean="0">
+                <a:solidFill>
+                  <a:srgbClr val="FF0000"/>
+                </a:solidFill>
+                <a:latin typeface="Courier New" pitchFamily="49" charset="0"/>
+                <a:cs typeface="Courier New" pitchFamily="49" charset="0"/>
+              </a:rPr>
+              <a:t>Questions are independent </a:t>
+            </a:r>
+            <a:r>
+              <a:rPr lang="en-US" sz="1400" b="1" dirty="0" smtClean="0">
+                <a:solidFill>
+                  <a:srgbClr val="00B050"/>
+                </a:solidFill>
+                <a:latin typeface="Courier New" pitchFamily="49" charset="0"/>
+                <a:cs typeface="Courier New" pitchFamily="49" charset="0"/>
+              </a:rPr>
+              <a:t>- reset variables</a:t>
+            </a:r>
+          </a:p>
+          <a:p>
+            <a:pPr marL="0" indent="0">
+              <a:buNone/>
+            </a:pPr>
             <a:r>
               <a:rPr lang="en-US" sz="1400" b="1" dirty="0">
-                <a:latin typeface="Courier New" pitchFamily="49" charset="0"/>
-                <a:cs typeface="Courier New" pitchFamily="49" charset="0"/>
-              </a:rPr>
-              <a:t>:</a:t>
-            </a:r>
-          </a:p>
-          <a:p>
-            <a:pPr marL="0" indent="0">
-              <a:buNone/>
-            </a:pPr>
-            <a:r>
-              <a:rPr lang="en-US" sz="1400" b="1" dirty="0" err="1">
-                <a:solidFill>
-                  <a:schemeClr val="accent2"/>
-                </a:solidFill>
-                <a:latin typeface="Courier New" pitchFamily="49" charset="0"/>
-                <a:cs typeface="Courier New" pitchFamily="49" charset="0"/>
-              </a:rPr>
-              <a:t>xPtr</a:t>
+                <a:solidFill>
+                  <a:srgbClr val="00B050"/>
+                </a:solidFill>
+                <a:latin typeface="Courier New" pitchFamily="49" charset="0"/>
+                <a:cs typeface="Courier New" pitchFamily="49" charset="0"/>
+              </a:rPr>
+              <a:t>	</a:t>
             </a:r>
             <a:r>
               <a:rPr lang="en-US" sz="1400" b="1" dirty="0" smtClean="0">
                 <a:solidFill>
-                  <a:schemeClr val="accent2"/>
-                </a:solidFill>
-                <a:latin typeface="Courier New" pitchFamily="49" charset="0"/>
-                <a:cs typeface="Courier New" pitchFamily="49" charset="0"/>
-              </a:rPr>
-              <a:t>++;        </a:t>
-            </a:r>
-            <a:r>
-              <a:rPr lang="en-US" sz="1400" b="1" dirty="0" smtClean="0">
-                <a:solidFill>
                   <a:srgbClr val="00B050"/>
                 </a:solidFill>
                 <a:latin typeface="Courier New" pitchFamily="49" charset="0"/>
                 <a:cs typeface="Courier New" pitchFamily="49" charset="0"/>
               </a:rPr>
-              <a:t>// </a:t>
-            </a:r>
-            <a:r>
-              <a:rPr lang="en-US" sz="1400" b="1" dirty="0" err="1" smtClean="0">
+              <a:t>     to </a:t>
+            </a:r>
+            <a:r>
+              <a:rPr lang="en-US" sz="1400" b="1" dirty="0">
                 <a:solidFill>
                   <a:srgbClr val="00B050"/>
                 </a:solidFill>
                 <a:latin typeface="Courier New" pitchFamily="49" charset="0"/>
                 <a:cs typeface="Courier New" pitchFamily="49" charset="0"/>
               </a:rPr>
-              <a:t>xPtr</a:t>
-            </a:r>
-            <a:r>
-              <a:rPr lang="en-US" sz="1400" b="1" dirty="0" smtClean="0">
-                <a:solidFill>
-                  <a:srgbClr val="00B050"/>
-                </a:solidFill>
-                <a:latin typeface="Courier New" pitchFamily="49" charset="0"/>
-                <a:cs typeface="Courier New" pitchFamily="49" charset="0"/>
-              </a:rPr>
-              <a:t> </a:t>
-            </a:r>
-            <a:r>
-              <a:rPr lang="en-US" sz="1400" b="1" dirty="0">
-                <a:solidFill>
-                  <a:srgbClr val="00B050"/>
-                </a:solidFill>
-                <a:latin typeface="Courier New" pitchFamily="49" charset="0"/>
-                <a:cs typeface="Courier New" pitchFamily="49" charset="0"/>
-              </a:rPr>
-              <a:t>= </a:t>
-            </a:r>
-            <a:r>
-              <a:rPr lang="en-US" sz="1400" b="1" dirty="0" smtClean="0">
-                <a:solidFill>
-                  <a:srgbClr val="00B050"/>
-                </a:solidFill>
-                <a:latin typeface="Courier New" pitchFamily="49" charset="0"/>
-                <a:cs typeface="Courier New" pitchFamily="49" charset="0"/>
-              </a:rPr>
-              <a:t>?</a:t>
+              <a:t>original state</a:t>
             </a:r>
             <a:endParaRPr lang="en-US" sz="1400" b="1" dirty="0">
               <a:solidFill>
@@ -7732,44 +7653,64 @@
               <a:buNone/>
             </a:pPr>
             <a:r>
+              <a:rPr lang="en-US" sz="1400" b="1" dirty="0" err="1" smtClean="0">
+                <a:solidFill>
+                  <a:schemeClr val="accent2"/>
+                </a:solidFill>
+                <a:latin typeface="Courier New" pitchFamily="49" charset="0"/>
+                <a:cs typeface="Courier New" pitchFamily="49" charset="0"/>
+              </a:rPr>
+              <a:t>xPtr</a:t>
+            </a:r>
+            <a:r>
+              <a:rPr lang="en-US" sz="1400" b="1" dirty="0" smtClean="0">
+                <a:solidFill>
+                  <a:schemeClr val="accent2"/>
+                </a:solidFill>
+                <a:latin typeface="Courier New" pitchFamily="49" charset="0"/>
+                <a:cs typeface="Courier New" pitchFamily="49" charset="0"/>
+              </a:rPr>
+              <a:t>++;        </a:t>
+            </a:r>
+            <a:r>
+              <a:rPr lang="en-US" sz="1400" b="1" dirty="0" smtClean="0">
+                <a:solidFill>
+                  <a:srgbClr val="00B050"/>
+                </a:solidFill>
+                <a:latin typeface="Courier New" pitchFamily="49" charset="0"/>
+                <a:cs typeface="Courier New" pitchFamily="49" charset="0"/>
+              </a:rPr>
+              <a:t>// </a:t>
+            </a:r>
+            <a:r>
+              <a:rPr lang="en-US" sz="1400" b="1" dirty="0" err="1" smtClean="0">
+                <a:solidFill>
+                  <a:srgbClr val="00B050"/>
+                </a:solidFill>
+                <a:latin typeface="Courier New" pitchFamily="49" charset="0"/>
+                <a:cs typeface="Courier New" pitchFamily="49" charset="0"/>
+              </a:rPr>
+              <a:t>xPtr</a:t>
+            </a:r>
+            <a:r>
+              <a:rPr lang="en-US" sz="1400" b="1" dirty="0" smtClean="0">
+                <a:solidFill>
+                  <a:srgbClr val="00B050"/>
+                </a:solidFill>
+                <a:latin typeface="Courier New" pitchFamily="49" charset="0"/>
+                <a:cs typeface="Courier New" pitchFamily="49" charset="0"/>
+              </a:rPr>
+              <a:t> </a:t>
+            </a:r>
+            <a:r>
               <a:rPr lang="en-US" sz="1400" b="1" dirty="0">
                 <a:solidFill>
-                  <a:schemeClr val="accent2"/>
-                </a:solidFill>
-                <a:latin typeface="Courier New" pitchFamily="49" charset="0"/>
-                <a:cs typeface="Courier New" pitchFamily="49" charset="0"/>
-              </a:rPr>
-              <a:t>x = *</a:t>
-            </a:r>
-            <a:r>
-              <a:rPr lang="en-US" sz="1400" b="1" dirty="0" err="1">
-                <a:solidFill>
-                  <a:schemeClr val="accent2"/>
-                </a:solidFill>
-                <a:latin typeface="Courier New" pitchFamily="49" charset="0"/>
-                <a:cs typeface="Courier New" pitchFamily="49" charset="0"/>
-              </a:rPr>
-              <a:t>xPtr</a:t>
-            </a:r>
-            <a:r>
-              <a:rPr lang="en-US" sz="1400" b="1" dirty="0">
-                <a:solidFill>
-                  <a:schemeClr val="accent2"/>
-                </a:solidFill>
-                <a:latin typeface="Courier New" pitchFamily="49" charset="0"/>
-                <a:cs typeface="Courier New" pitchFamily="49" charset="0"/>
-              </a:rPr>
-              <a:t> + 1; </a:t>
-            </a:r>
-            <a:r>
-              <a:rPr lang="en-US" sz="1400" b="1" dirty="0">
-                <a:solidFill>
                   <a:srgbClr val="00B050"/>
                 </a:solidFill>
                 <a:latin typeface="Courier New" pitchFamily="49" charset="0"/>
                 <a:cs typeface="Courier New" pitchFamily="49" charset="0"/>
               </a:rPr>
-              <a:t>// x = </a:t>
+              <a:t>= </a:t>
             </a:r>
             <a:r>
               <a:rPr lang="en-US" sz="1400" b="1" dirty="0" smtClean="0">
@@ -7781,11 +7722,6 @@
               </a:rPr>
               <a:t>?</a:t>
             </a:r>
-          </a:p>
-          <a:p>
-            <a:pPr marL="0" indent="0">
-              <a:buNone/>
-            </a:pPr>
             <a:endParaRPr lang="en-US" sz="1400" b="1" dirty="0">
               <a:solidFill>
                 <a:schemeClr val="accent2"/>
@@ -7806,6 +7742,105 @@
                 <a:latin typeface="Courier New" pitchFamily="49" charset="0"/>
                 <a:cs typeface="Courier New" pitchFamily="49" charset="0"/>
               </a:rPr>
+              <a:t>x = *</a:t>
+            </a:r>
+            <a:r>
+              <a:rPr lang="en-US" sz="1400" b="1" dirty="0" err="1">
+                <a:solidFill>
+                  <a:schemeClr val="accent2"/>
+                </a:solidFill>
+                <a:latin typeface="Courier New" pitchFamily="49" charset="0"/>
+                <a:cs typeface="Courier New" pitchFamily="49" charset="0"/>
+              </a:rPr>
+              <a:t>xPtr</a:t>
+            </a:r>
+            <a:r>
+              <a:rPr lang="en-US" sz="1400" b="1" dirty="0">
+                <a:solidFill>
+                  <a:schemeClr val="accent2"/>
+                </a:solidFill>
+                <a:latin typeface="Courier New" pitchFamily="49" charset="0"/>
+                <a:cs typeface="Courier New" pitchFamily="49" charset="0"/>
+              </a:rPr>
+              <a:t> + 1; </a:t>
+            </a:r>
+            <a:r>
+              <a:rPr lang="en-US" sz="1400" b="1" dirty="0">
+                <a:solidFill>
+                  <a:srgbClr val="00B050"/>
+                </a:solidFill>
+                <a:latin typeface="Courier New" pitchFamily="49" charset="0"/>
+                <a:cs typeface="Courier New" pitchFamily="49" charset="0"/>
+              </a:rPr>
+              <a:t>// x = </a:t>
+            </a:r>
+            <a:r>
+              <a:rPr lang="en-US" sz="1400" b="1" dirty="0" smtClean="0">
+                <a:solidFill>
+                  <a:srgbClr val="00B050"/>
+                </a:solidFill>
+                <a:latin typeface="Courier New" pitchFamily="49" charset="0"/>
+                <a:cs typeface="Courier New" pitchFamily="49" charset="0"/>
+              </a:rPr>
+              <a:t>?</a:t>
+            </a:r>
+          </a:p>
+          <a:p>
+            <a:pPr marL="0" indent="0">
+              <a:buNone/>
+            </a:pPr>
+            <a:endParaRPr lang="en-US" sz="1400" b="1" dirty="0" smtClean="0">
+              <a:solidFill>
+                <a:srgbClr val="00B050"/>
+              </a:solidFill>
+              <a:latin typeface="Courier New" pitchFamily="49" charset="0"/>
+              <a:cs typeface="Courier New" pitchFamily="49" charset="0"/>
+            </a:endParaRPr>
+          </a:p>
+          <a:p>
+            <a:pPr marL="0" indent="0">
+              <a:buNone/>
+            </a:pPr>
+            <a:r>
+              <a:rPr lang="en-US" sz="1400" b="1" dirty="0" smtClean="0">
+                <a:solidFill>
+                  <a:srgbClr val="00B050"/>
+                </a:solidFill>
+                <a:latin typeface="Courier New" pitchFamily="49" charset="0"/>
+                <a:cs typeface="Courier New" pitchFamily="49" charset="0"/>
+              </a:rPr>
+              <a:t>// Reset variables to </a:t>
+            </a:r>
+            <a:r>
+              <a:rPr lang="en-US" sz="1400" b="1" dirty="0">
+                <a:solidFill>
+                  <a:srgbClr val="00B050"/>
+                </a:solidFill>
+                <a:latin typeface="Courier New" pitchFamily="49" charset="0"/>
+                <a:cs typeface="Courier New" pitchFamily="49" charset="0"/>
+              </a:rPr>
+              <a:t>original state</a:t>
+            </a:r>
+            <a:endParaRPr lang="en-US" sz="1400" b="1" dirty="0">
+              <a:solidFill>
+                <a:schemeClr val="accent2"/>
+              </a:solidFill>
+              <a:latin typeface="Courier New" pitchFamily="49" charset="0"/>
+              <a:cs typeface="Courier New" pitchFamily="49" charset="0"/>
+            </a:endParaRPr>
+          </a:p>
+          <a:p>
+            <a:pPr marL="0" indent="0">
+              <a:buNone/>
+            </a:pPr>
+            <a:r>
+              <a:rPr lang="en-US" sz="1400" b="1" dirty="0">
+                <a:solidFill>
+                  <a:schemeClr val="accent2"/>
+                </a:solidFill>
+                <a:latin typeface="Courier New" pitchFamily="49" charset="0"/>
+                <a:cs typeface="Courier New" pitchFamily="49" charset="0"/>
+              </a:rPr>
               <a:t>*</a:t>
             </a:r>
             <a:r>
@@ -7890,7 +7925,7 @@
             <a:pPr marL="0" indent="0">
               <a:buNone/>
             </a:pPr>
-            <a:endParaRPr lang="en-US" sz="1400" b="1" dirty="0">
+            <a:endParaRPr lang="en-US" sz="1400" b="1" dirty="0" smtClean="0">
               <a:solidFill>
                 <a:srgbClr val="00B050"/>
               </a:solidFill>
@@ -7903,14 +7938,66 @@
               <a:buNone/>
             </a:pPr>
             <a:r>
+              <a:rPr lang="en-US" sz="1400" b="1" dirty="0" smtClean="0">
+                <a:solidFill>
+                  <a:srgbClr val="00B050"/>
+                </a:solidFill>
+                <a:latin typeface="Courier New" pitchFamily="49" charset="0"/>
+                <a:cs typeface="Courier New" pitchFamily="49" charset="0"/>
+              </a:rPr>
+              <a:t>// </a:t>
+            </a:r>
+            <a:r>
               <a:rPr lang="en-US" sz="1400" b="1" dirty="0">
                 <a:solidFill>
-                  <a:schemeClr val="accent2"/>
-                </a:solidFill>
-                <a:latin typeface="Courier New" pitchFamily="49" charset="0"/>
-                <a:cs typeface="Courier New" pitchFamily="49" charset="0"/>
-              </a:rPr>
-              <a:t>y = </a:t>
+                  <a:srgbClr val="00B050"/>
+                </a:solidFill>
+                <a:latin typeface="Courier New" pitchFamily="49" charset="0"/>
+                <a:cs typeface="Courier New" pitchFamily="49" charset="0"/>
+              </a:rPr>
+              <a:t>Reset </a:t>
+            </a:r>
+            <a:r>
+              <a:rPr lang="en-US" sz="1400" b="1" dirty="0" smtClean="0">
+                <a:solidFill>
+                  <a:srgbClr val="00B050"/>
+                </a:solidFill>
+                <a:latin typeface="Courier New" pitchFamily="49" charset="0"/>
+                <a:cs typeface="Courier New" pitchFamily="49" charset="0"/>
+              </a:rPr>
+              <a:t>variables to original state</a:t>
+            </a:r>
+            <a:endParaRPr lang="en-US" sz="1400" b="1" dirty="0">
+              <a:solidFill>
+                <a:schemeClr val="accent2"/>
+              </a:solidFill>
+              <a:latin typeface="Courier New" pitchFamily="49" charset="0"/>
+              <a:cs typeface="Courier New" pitchFamily="49" charset="0"/>
+            </a:endParaRPr>
+          </a:p>
+          <a:p>
+            <a:pPr marL="0" indent="0">
+              <a:buNone/>
+            </a:pPr>
+            <a:r>
+              <a:rPr lang="en-US" sz="1400" b="1" dirty="0" smtClean="0">
+                <a:solidFill>
+                  <a:schemeClr val="accent2"/>
+                </a:solidFill>
+                <a:latin typeface="Courier New" pitchFamily="49" charset="0"/>
+                <a:cs typeface="Courier New" pitchFamily="49" charset="0"/>
+              </a:rPr>
+              <a:t>y </a:t>
+            </a:r>
+            <a:r>
+              <a:rPr lang="en-US" sz="1400" b="1" dirty="0">
+                <a:solidFill>
+                  <a:schemeClr val="accent2"/>
+                </a:solidFill>
+                <a:latin typeface="Courier New" pitchFamily="49" charset="0"/>
+                <a:cs typeface="Courier New" pitchFamily="49" charset="0"/>
+              </a:rPr>
+              <a:t>= </a:t>
             </a:r>
             <a:r>
               <a:rPr lang="en-US" sz="1400" b="1" dirty="0" err="1">
@@ -8043,7 +8130,7 @@
           <p:nvPr>
             <p:extLst>
               <p:ext uri="{D42A27DB-BD31-4B8C-83A1-F6EECF244321}">
-                <p14:modId xmlns:p14="http://schemas.microsoft.com/office/powerpoint/2010/main" val="3168594175"/>
+                <p14:modId xmlns:p14="http://schemas.microsoft.com/office/powerpoint/2010/main" val="558586746"/>
               </p:ext>
             </p:extLst>
           </p:nvPr>
@@ -8056,7 +8143,7 @@
           <a:graphicData uri="http://schemas.openxmlformats.org/drawingml/2006/table">
             <a:tbl>
               <a:tblPr firstRow="1" bandRow="1">
-                <a:tableStyleId>{5C22544A-7EE6-4342-B048-85BDC9FD1C3A}</a:tableStyleId>
+                <a:tableStyleId>{21E4AEA4-8DFA-4A89-87EB-49C32662AFE0}</a:tableStyleId>
               </a:tblPr>
               <a:tblGrid>
                 <a:gridCol w="1016000"/>
@@ -8391,7 +8478,7 @@
           <p:nvPr>
             <p:extLst>
               <p:ext uri="{D42A27DB-BD31-4B8C-83A1-F6EECF244321}">
-                <p14:modId xmlns:p14="http://schemas.microsoft.com/office/powerpoint/2010/main" val="1032730079"/>
+                <p14:modId xmlns:p14="http://schemas.microsoft.com/office/powerpoint/2010/main" val="939339584"/>
               </p:ext>
             </p:extLst>
           </p:nvPr>
@@ -8404,7 +8491,7 @@
           <a:graphicData uri="http://schemas.openxmlformats.org/drawingml/2006/table">
             <a:tbl>
               <a:tblPr firstRow="1" bandRow="1">
-                <a:tableStyleId>{5C22544A-7EE6-4342-B048-85BDC9FD1C3A}</a:tableStyleId>
+                <a:tableStyleId>{21E4AEA4-8DFA-4A89-87EB-49C32662AFE0}</a:tableStyleId>
               </a:tblPr>
               <a:tblGrid>
                 <a:gridCol w="1003414"/>
@@ -8535,7 +8622,270 @@
   <p:timing>
     <p:tnLst>
       <p:par>
-        <p:cTn id="1" dur="indefinite" restart="never" nodeType="tmRoot"/>
+        <p:cTn id="1" dur="indefinite" restart="never" nodeType="tmRoot">
+          <p:childTnLst>
+            <p:seq concurrent="1" nextAc="seek">
+              <p:cTn id="2" dur="indefinite" nodeType="mainSeq">
+                <p:childTnLst>
+                  <p:par>
+                    <p:cTn id="3" fill="hold">
+                      <p:stCondLst>
+                        <p:cond delay="indefinite"/>
+                      </p:stCondLst>
+                      <p:childTnLst>
+                        <p:par>
+                          <p:cTn id="4" fill="hold">
+                            <p:stCondLst>
+                              <p:cond delay="0"/>
+                            </p:stCondLst>
+                            <p:childTnLst>
+                              <p:par>
+                                <p:cTn id="5" presetID="1" presetClass="entr" presetSubtype="0" fill="hold" nodeType="clickEffect">
+                                  <p:stCondLst>
+                                    <p:cond delay="0"/>
+                                  </p:stCondLst>
+                                  <p:childTnLst>
+                                    <p:set>
+                                      <p:cBhvr>
+                                        <p:cTn id="6" dur="1" fill="hold">
+                                          <p:stCondLst>
+                                            <p:cond delay="0"/>
+                                          </p:stCondLst>
+                                        </p:cTn>
+                                        <p:tgtEl>
+                                          <p:spTgt spid="3">
+                                            <p:txEl>
+                                              <p:pRg st="8" end="8"/>
+                                            </p:txEl>
+                                          </p:spTgt>
+                                        </p:tgtEl>
+                                        <p:attrNameLst>
+                                          <p:attrName>style.visibility</p:attrName>
+                                        </p:attrNameLst>
+                                      </p:cBhvr>
+                                      <p:to>
+                                        <p:strVal val="visible"/>
+                                      </p:to>
+                                    </p:set>
+                                  </p:childTnLst>
+                                </p:cTn>
+                              </p:par>
+                              <p:par>
+                                <p:cTn id="7" presetID="1" presetClass="entr" presetSubtype="0" fill="hold" nodeType="withEffect">
+                                  <p:stCondLst>
+                                    <p:cond delay="0"/>
+                                  </p:stCondLst>
+                                  <p:childTnLst>
+                                    <p:set>
+                                      <p:cBhvr>
+                                        <p:cTn id="8" dur="1" fill="hold">
+                                          <p:stCondLst>
+                                            <p:cond delay="0"/>
+                                          </p:stCondLst>
+                                        </p:cTn>
+                                        <p:tgtEl>
+                                          <p:spTgt spid="3">
+                                            <p:txEl>
+                                              <p:pRg st="9" end="9"/>
+                                            </p:txEl>
+                                          </p:spTgt>
+                                        </p:tgtEl>
+                                        <p:attrNameLst>
+                                          <p:attrName>style.visibility</p:attrName>
+                                        </p:attrNameLst>
+                                      </p:cBhvr>
+                                      <p:to>
+                                        <p:strVal val="visible"/>
+                                      </p:to>
+                                    </p:set>
+                                  </p:childTnLst>
+                                </p:cTn>
+                              </p:par>
+                            </p:childTnLst>
+                          </p:cTn>
+                        </p:par>
+                      </p:childTnLst>
+                    </p:cTn>
+                  </p:par>
+                  <p:par>
+                    <p:cTn id="9" fill="hold">
+                      <p:stCondLst>
+                        <p:cond delay="indefinite"/>
+                      </p:stCondLst>
+                      <p:childTnLst>
+                        <p:par>
+                          <p:cTn id="10" fill="hold">
+                            <p:stCondLst>
+                              <p:cond delay="0"/>
+                            </p:stCondLst>
+                            <p:childTnLst>
+                              <p:par>
+                                <p:cTn id="11" presetID="1" presetClass="entr" presetSubtype="0" fill="hold" nodeType="clickEffect">
+                                  <p:stCondLst>
+                                    <p:cond delay="0"/>
+                                  </p:stCondLst>
+                                  <p:childTnLst>
+                                    <p:set>
+                                      <p:cBhvr>
+                                        <p:cTn id="12" dur="1" fill="hold">
+                                          <p:stCondLst>
+                                            <p:cond delay="0"/>
+                                          </p:stCondLst>
+                                        </p:cTn>
+                                        <p:tgtEl>
+                                          <p:spTgt spid="3">
+                                            <p:txEl>
+                                              <p:pRg st="11" end="11"/>
+                                            </p:txEl>
+                                          </p:spTgt>
+                                        </p:tgtEl>
+                                        <p:attrNameLst>
+                                          <p:attrName>style.visibility</p:attrName>
+                                        </p:attrNameLst>
+                                      </p:cBhvr>
+                                      <p:to>
+                                        <p:strVal val="visible"/>
+                                      </p:to>
+                                    </p:set>
+                                  </p:childTnLst>
+                                </p:cTn>
+                              </p:par>
+                              <p:par>
+                                <p:cTn id="13" presetID="1" presetClass="entr" presetSubtype="0" fill="hold" nodeType="withEffect">
+                                  <p:stCondLst>
+                                    <p:cond delay="0"/>
+                                  </p:stCondLst>
+                                  <p:childTnLst>
+                                    <p:set>
+                                      <p:cBhvr>
+                                        <p:cTn id="14" dur="1" fill="hold">
+                                          <p:stCondLst>
+                                            <p:cond delay="0"/>
+                                          </p:stCondLst>
+                                        </p:cTn>
+                                        <p:tgtEl>
+                                          <p:spTgt spid="3">
+                                            <p:txEl>
+                                              <p:pRg st="12" end="12"/>
+                                            </p:txEl>
+                                          </p:spTgt>
+                                        </p:tgtEl>
+                                        <p:attrNameLst>
+                                          <p:attrName>style.visibility</p:attrName>
+                                        </p:attrNameLst>
+                                      </p:cBhvr>
+                                      <p:to>
+                                        <p:strVal val="visible"/>
+                                      </p:to>
+                                    </p:set>
+                                  </p:childTnLst>
+                                </p:cTn>
+                              </p:par>
+                            </p:childTnLst>
+                          </p:cTn>
+                        </p:par>
+                      </p:childTnLst>
+                    </p:cTn>
+                  </p:par>
+                  <p:par>
+                    <p:cTn id="15" fill="hold">
+                      <p:stCondLst>
+                        <p:cond delay="indefinite"/>
+                      </p:stCondLst>
+                      <p:childTnLst>
+                        <p:par>
+                          <p:cTn id="16" fill="hold">
+                            <p:stCondLst>
+                              <p:cond delay="0"/>
+                            </p:stCondLst>
+                            <p:childTnLst>
+                              <p:par>
+                                <p:cTn id="17" presetID="1" presetClass="entr" presetSubtype="0" fill="hold" nodeType="clickEffect">
+                                  <p:stCondLst>
+                                    <p:cond delay="0"/>
+                                  </p:stCondLst>
+                                  <p:childTnLst>
+                                    <p:set>
+                                      <p:cBhvr>
+                                        <p:cTn id="18" dur="1" fill="hold">
+                                          <p:stCondLst>
+                                            <p:cond delay="0"/>
+                                          </p:stCondLst>
+                                        </p:cTn>
+                                        <p:tgtEl>
+                                          <p:spTgt spid="3">
+                                            <p:txEl>
+                                              <p:pRg st="14" end="14"/>
+                                            </p:txEl>
+                                          </p:spTgt>
+                                        </p:tgtEl>
+                                        <p:attrNameLst>
+                                          <p:attrName>style.visibility</p:attrName>
+                                        </p:attrNameLst>
+                                      </p:cBhvr>
+                                      <p:to>
+                                        <p:strVal val="visible"/>
+                                      </p:to>
+                                    </p:set>
+                                  </p:childTnLst>
+                                </p:cTn>
+                              </p:par>
+                              <p:par>
+                                <p:cTn id="19" presetID="1" presetClass="entr" presetSubtype="0" fill="hold" nodeType="withEffect">
+                                  <p:stCondLst>
+                                    <p:cond delay="0"/>
+                                  </p:stCondLst>
+                                  <p:childTnLst>
+                                    <p:set>
+                                      <p:cBhvr>
+                                        <p:cTn id="20" dur="1" fill="hold">
+                                          <p:stCondLst>
+                                            <p:cond delay="0"/>
+                                          </p:stCondLst>
+                                        </p:cTn>
+                                        <p:tgtEl>
+                                          <p:spTgt spid="3">
+                                            <p:txEl>
+                                              <p:pRg st="15" end="15"/>
+                                            </p:txEl>
+                                          </p:spTgt>
+                                        </p:tgtEl>
+                                        <p:attrNameLst>
+                                          <p:attrName>style.visibility</p:attrName>
+                                        </p:attrNameLst>
+                                      </p:cBhvr>
+                                      <p:to>
+                                        <p:strVal val="visible"/>
+                                      </p:to>
+                                    </p:set>
+                                  </p:childTnLst>
+                                </p:cTn>
+                              </p:par>
+                            </p:childTnLst>
+                          </p:cTn>
+                        </p:par>
+                      </p:childTnLst>
+                    </p:cTn>
+                  </p:par>
+                </p:childTnLst>
+              </p:cTn>
+              <p:prevCondLst>
+                <p:cond evt="onPrev" delay="0">
+                  <p:tgtEl>
+                    <p:sldTgt/>
+                  </p:tgtEl>
+                </p:cond>
+              </p:prevCondLst>
+              <p:nextCondLst>
+                <p:cond evt="onNext" delay="0">
+                  <p:tgtEl>
+                    <p:sldTgt/>
+                  </p:tgtEl>
+                </p:cond>
+              </p:nextCondLst>
+            </p:seq>
+          </p:childTnLst>
+        </p:cTn>
       </p:par>
     </p:tnLst>
   </p:timing>
@@ -9355,7 +9705,7 @@
           <p:nvPr>
             <p:extLst>
               <p:ext uri="{D42A27DB-BD31-4B8C-83A1-F6EECF244321}">
-                <p14:modId xmlns:p14="http://schemas.microsoft.com/office/powerpoint/2010/main" val="3409276913"/>
+                <p14:modId xmlns:p14="http://schemas.microsoft.com/office/powerpoint/2010/main" val="2211377847"/>
               </p:ext>
             </p:extLst>
           </p:nvPr>
@@ -9368,7 +9718,7 @@
           <a:graphicData uri="http://schemas.openxmlformats.org/drawingml/2006/table">
             <a:tbl>
               <a:tblPr firstRow="1" bandRow="1">
-                <a:tableStyleId>{5C22544A-7EE6-4342-B048-85BDC9FD1C3A}</a:tableStyleId>
+                <a:tableStyleId>{21E4AEA4-8DFA-4A89-87EB-49C32662AFE0}</a:tableStyleId>
               </a:tblPr>
               <a:tblGrid>
                 <a:gridCol w="1016000"/>
@@ -10796,51 +11146,59 @@
             <a:pPr marL="0" indent="0">
               <a:buNone/>
             </a:pPr>
-            <a:endParaRPr lang="fr-FR" sz="1400" b="1" dirty="0" smtClean="0">
+            <a:r>
+              <a:rPr lang="en-US" sz="1400" b="1" dirty="0">
+                <a:solidFill>
+                  <a:srgbClr val="00B050"/>
+                </a:solidFill>
+                <a:latin typeface="Courier New" pitchFamily="49" charset="0"/>
+                <a:cs typeface="Courier New" pitchFamily="49" charset="0"/>
+              </a:rPr>
+              <a:t>// </a:t>
+            </a:r>
+            <a:r>
+              <a:rPr lang="en-US" sz="1400" b="1" dirty="0">
+                <a:solidFill>
+                  <a:srgbClr val="FF0000"/>
+                </a:solidFill>
+                <a:latin typeface="Courier New" pitchFamily="49" charset="0"/>
+                <a:cs typeface="Courier New" pitchFamily="49" charset="0"/>
+              </a:rPr>
+              <a:t>Questions are independent </a:t>
+            </a:r>
+            <a:r>
+              <a:rPr lang="en-US" sz="1400" b="1" dirty="0">
+                <a:solidFill>
+                  <a:srgbClr val="00B050"/>
+                </a:solidFill>
+                <a:latin typeface="Courier New" pitchFamily="49" charset="0"/>
+                <a:cs typeface="Courier New" pitchFamily="49" charset="0"/>
+              </a:rPr>
+              <a:t>- reset </a:t>
+            </a:r>
+            <a:r>
+              <a:rPr lang="en-US" sz="1400" b="1" dirty="0" smtClean="0">
+                <a:solidFill>
+                  <a:srgbClr val="00B050"/>
+                </a:solidFill>
+                <a:latin typeface="Courier New" pitchFamily="49" charset="0"/>
+                <a:cs typeface="Courier New" pitchFamily="49" charset="0"/>
+              </a:rPr>
+              <a:t>variables </a:t>
+            </a:r>
+            <a:r>
+              <a:rPr lang="en-US" sz="1400" b="1" dirty="0">
+                <a:solidFill>
+                  <a:srgbClr val="00B050"/>
+                </a:solidFill>
+                <a:latin typeface="Courier New" pitchFamily="49" charset="0"/>
+                <a:cs typeface="Courier New" pitchFamily="49" charset="0"/>
+              </a:rPr>
+              <a:t>to original state</a:t>
+            </a:r>
+            <a:endParaRPr lang="en-US" sz="1400" b="1" dirty="0">
               <a:solidFill>
                 <a:schemeClr val="accent2"/>
-              </a:solidFill>
-              <a:latin typeface="Courier New" pitchFamily="49" charset="0"/>
-              <a:cs typeface="Courier New" pitchFamily="49" charset="0"/>
-            </a:endParaRPr>
-          </a:p>
-          <a:p>
-            <a:pPr marL="0" indent="0">
-              <a:buNone/>
-            </a:pPr>
-            <a:r>
-              <a:rPr lang="fr-FR" sz="1400" b="1" dirty="0" smtClean="0">
-                <a:solidFill>
-                  <a:schemeClr val="accent2"/>
-                </a:solidFill>
-                <a:latin typeface="Courier New" pitchFamily="49" charset="0"/>
-                <a:cs typeface="Courier New" pitchFamily="49" charset="0"/>
-              </a:rPr>
-              <a:t>x </a:t>
-            </a:r>
-            <a:r>
-              <a:rPr lang="fr-FR" sz="1400" b="1" dirty="0">
-                <a:solidFill>
-                  <a:schemeClr val="accent2"/>
-                </a:solidFill>
-                <a:latin typeface="Courier New" pitchFamily="49" charset="0"/>
-                <a:cs typeface="Courier New" pitchFamily="49" charset="0"/>
-              </a:rPr>
-              <a:t>= y[2]; </a:t>
-            </a:r>
-            <a:r>
-              <a:rPr lang="fr-FR" sz="1400" b="1" dirty="0" smtClean="0">
-                <a:solidFill>
-                  <a:schemeClr val="accent2"/>
-                </a:solidFill>
-                <a:latin typeface="Courier New" pitchFamily="49" charset="0"/>
-                <a:cs typeface="Courier New" pitchFamily="49" charset="0"/>
-              </a:rPr>
-              <a:t>                      </a:t>
-            </a:r>
-            <a:endParaRPr lang="fr-FR" sz="1400" b="1" dirty="0" smtClean="0">
-              <a:solidFill>
-                <a:srgbClr val="00B050"/>
               </a:solidFill>
               <a:latin typeface="Courier New" pitchFamily="49" charset="0"/>
               <a:cs typeface="Courier New" pitchFamily="49" charset="0"/>
@@ -10863,6 +11221,82 @@
               <a:buNone/>
             </a:pPr>
             <a:r>
+              <a:rPr lang="fr-FR" sz="1400" b="1" dirty="0" smtClean="0">
+                <a:solidFill>
+                  <a:schemeClr val="accent2"/>
+                </a:solidFill>
+                <a:latin typeface="Courier New" pitchFamily="49" charset="0"/>
+                <a:cs typeface="Courier New" pitchFamily="49" charset="0"/>
+              </a:rPr>
+              <a:t>x </a:t>
+            </a:r>
+            <a:r>
+              <a:rPr lang="fr-FR" sz="1400" b="1" dirty="0">
+                <a:solidFill>
+                  <a:schemeClr val="accent2"/>
+                </a:solidFill>
+                <a:latin typeface="Courier New" pitchFamily="49" charset="0"/>
+                <a:cs typeface="Courier New" pitchFamily="49" charset="0"/>
+              </a:rPr>
+              <a:t>= y[2]; </a:t>
+            </a:r>
+            <a:r>
+              <a:rPr lang="fr-FR" sz="1400" b="1" dirty="0" smtClean="0">
+                <a:solidFill>
+                  <a:schemeClr val="accent2"/>
+                </a:solidFill>
+                <a:latin typeface="Courier New" pitchFamily="49" charset="0"/>
+                <a:cs typeface="Courier New" pitchFamily="49" charset="0"/>
+              </a:rPr>
+              <a:t>                      </a:t>
+            </a:r>
+            <a:endParaRPr lang="fr-FR" sz="1400" b="1" dirty="0" smtClean="0">
+              <a:solidFill>
+                <a:srgbClr val="00B050"/>
+              </a:solidFill>
+              <a:latin typeface="Courier New" pitchFamily="49" charset="0"/>
+              <a:cs typeface="Courier New" pitchFamily="49" charset="0"/>
+            </a:endParaRPr>
+          </a:p>
+          <a:p>
+            <a:pPr marL="0" indent="0">
+              <a:buNone/>
+            </a:pPr>
+            <a:endParaRPr lang="fr-FR" sz="1400" b="1" dirty="0" smtClean="0">
+              <a:solidFill>
+                <a:schemeClr val="accent2"/>
+              </a:solidFill>
+              <a:latin typeface="Courier New" pitchFamily="49" charset="0"/>
+              <a:cs typeface="Courier New" pitchFamily="49" charset="0"/>
+            </a:endParaRPr>
+          </a:p>
+          <a:p>
+            <a:pPr marL="0" indent="0">
+              <a:buNone/>
+            </a:pPr>
+            <a:r>
+              <a:rPr lang="en-US" sz="1400" b="1" dirty="0">
+                <a:solidFill>
+                  <a:srgbClr val="00B050"/>
+                </a:solidFill>
+                <a:latin typeface="Courier New" pitchFamily="49" charset="0"/>
+                <a:cs typeface="Courier New" pitchFamily="49" charset="0"/>
+              </a:rPr>
+              <a:t>// Reset variables to original state</a:t>
+            </a:r>
+            <a:endParaRPr lang="en-US" sz="1400" b="1" dirty="0">
+              <a:solidFill>
+                <a:schemeClr val="accent2"/>
+              </a:solidFill>
+              <a:latin typeface="Courier New" pitchFamily="49" charset="0"/>
+              <a:cs typeface="Courier New" pitchFamily="49" charset="0"/>
+            </a:endParaRPr>
+          </a:p>
+          <a:p>
+            <a:pPr marL="0" indent="0">
+              <a:buNone/>
+            </a:pPr>
+            <a:r>
               <a:rPr lang="fr-FR" sz="1400" b="1" dirty="0" err="1" smtClean="0">
                 <a:solidFill>
                   <a:schemeClr val="accent2"/>
@@ -10959,7 +11393,29 @@
               <a:buNone/>
             </a:pPr>
             <a:r>
-              <a:rPr lang="fr-FR" sz="1400" b="1" dirty="0" err="1">
+              <a:rPr lang="en-US" sz="1400" b="1" dirty="0">
+                <a:solidFill>
+                  <a:srgbClr val="00B050"/>
+                </a:solidFill>
+                <a:latin typeface="Courier New" pitchFamily="49" charset="0"/>
+                <a:cs typeface="Courier New" pitchFamily="49" charset="0"/>
+              </a:rPr>
+              <a:t>// Reset variables to original state</a:t>
+            </a:r>
+            <a:endParaRPr lang="en-US" sz="1400" b="1" dirty="0">
+              <a:solidFill>
+                <a:schemeClr val="accent2"/>
+              </a:solidFill>
+              <a:latin typeface="Courier New" pitchFamily="49" charset="0"/>
+              <a:cs typeface="Courier New" pitchFamily="49" charset="0"/>
+            </a:endParaRPr>
+          </a:p>
+          <a:p>
+            <a:pPr marL="0" indent="0">
+              <a:buNone/>
+            </a:pPr>
+            <a:r>
+              <a:rPr lang="fr-FR" sz="1400" b="1" dirty="0" err="1" smtClean="0">
                 <a:solidFill>
                   <a:schemeClr val="accent2"/>
                 </a:solidFill>
@@ -10969,6 +11425,16 @@
               <a:t>letter_ptr</a:t>
             </a:r>
             <a:r>
+              <a:rPr lang="fr-FR" sz="1400" b="1" dirty="0" smtClean="0">
+                <a:solidFill>
+                  <a:schemeClr val="accent2"/>
+                </a:solidFill>
+                <a:latin typeface="Courier New" pitchFamily="49" charset="0"/>
+                <a:cs typeface="Courier New" pitchFamily="49" charset="0"/>
+              </a:rPr>
+              <a:t> </a:t>
+            </a:r>
+            <a:r>
               <a:rPr lang="fr-FR" sz="1400" b="1" dirty="0">
                 <a:solidFill>
                   <a:schemeClr val="accent2"/>
@@ -10976,7 +11442,7 @@
                 <a:latin typeface="Courier New" pitchFamily="49" charset="0"/>
                 <a:cs typeface="Courier New" pitchFamily="49" charset="0"/>
               </a:rPr>
-              <a:t> = &amp;x;</a:t>
+              <a:t>= &amp;x;</a:t>
             </a:r>
             <a:endParaRPr lang="fr-FR" sz="1400" b="1" dirty="0">
               <a:solidFill>
@@ -11039,7 +11505,7 @@
           <p:nvPr>
             <p:extLst>
               <p:ext uri="{D42A27DB-BD31-4B8C-83A1-F6EECF244321}">
-                <p14:modId xmlns:p14="http://schemas.microsoft.com/office/powerpoint/2010/main" val="1517128492"/>
+                <p14:modId xmlns:p14="http://schemas.microsoft.com/office/powerpoint/2010/main" val="1697494237"/>
               </p:ext>
             </p:extLst>
           </p:nvPr>
@@ -11052,7 +11518,813 @@
           <a:graphicData uri="http://schemas.openxmlformats.org/drawingml/2006/table">
             <a:tbl>
               <a:tblPr firstRow="1" bandRow="1">
-                <a:tableStyleId>{5C22544A-7EE6-4342-B048-85BDC9FD1C3A}</a:tableStyleId>
+                <a:tableStyleId>{21E4AEA4-8DFA-4A89-87EB-49C32662AFE0}</a:tableStyleId>
+              </a:tblPr>
+              <a:tblGrid>
+                <a:gridCol w="1016000"/>
+                <a:gridCol w="1016000"/>
+              </a:tblGrid>
+              <a:tr h="370840">
+                <a:tc>
+                  <a:txBody>
+                    <a:bodyPr/>
+                    <a:lstStyle/>
+                    <a:p>
+                      <a:pPr algn="ctr"/>
+                      <a:r>
+                        <a:rPr lang="en-US" dirty="0" err="1" smtClean="0"/>
+                        <a:t>Addr</a:t>
+                      </a:r>
+                      <a:endParaRPr lang="en-US" dirty="0"/>
+                    </a:p>
+                  </a:txBody>
+                  <a:tcPr/>
+                </a:tc>
+                <a:tc>
+                  <a:txBody>
+                    <a:bodyPr/>
+                    <a:lstStyle/>
+                    <a:p>
+                      <a:pPr algn="ctr"/>
+                      <a:r>
+                        <a:rPr lang="en-US" dirty="0" smtClean="0"/>
+                        <a:t>Value</a:t>
+                      </a:r>
+                      <a:endParaRPr lang="en-US" dirty="0"/>
+                    </a:p>
+                  </a:txBody>
+                  <a:tcPr/>
+                </a:tc>
+              </a:tr>
+              <a:tr h="370840">
+                <a:tc>
+                  <a:txBody>
+                    <a:bodyPr/>
+                    <a:lstStyle/>
+                    <a:p>
+                      <a:pPr algn="ctr"/>
+                      <a:r>
+                        <a:rPr lang="en-US" dirty="0" smtClean="0"/>
+                        <a:t>0x800</a:t>
+                      </a:r>
+                      <a:endParaRPr lang="en-US" dirty="0"/>
+                    </a:p>
+                  </a:txBody>
+                  <a:tcPr/>
+                </a:tc>
+                <a:tc>
+                  <a:txBody>
+                    <a:bodyPr/>
+                    <a:lstStyle/>
+                    <a:p>
+                      <a:pPr algn="ctr"/>
+                      <a:endParaRPr lang="en-US" b="1" dirty="0"/>
+                    </a:p>
+                  </a:txBody>
+                  <a:tcPr/>
+                </a:tc>
+              </a:tr>
+              <a:tr h="370840">
+                <a:tc>
+                  <a:txBody>
+                    <a:bodyPr/>
+                    <a:lstStyle/>
+                    <a:p>
+                      <a:pPr algn="ctr"/>
+                      <a:r>
+                        <a:rPr lang="en-US" dirty="0" smtClean="0"/>
+                        <a:t>0x801</a:t>
+                      </a:r>
+                      <a:endParaRPr lang="en-US" dirty="0"/>
+                    </a:p>
+                  </a:txBody>
+                  <a:tcPr/>
+                </a:tc>
+                <a:tc>
+                  <a:txBody>
+                    <a:bodyPr/>
+                    <a:lstStyle/>
+                    <a:p>
+                      <a:pPr algn="ctr"/>
+                      <a:endParaRPr lang="en-US" dirty="0"/>
+                    </a:p>
+                  </a:txBody>
+                  <a:tcPr/>
+                </a:tc>
+              </a:tr>
+              <a:tr h="370840">
+                <a:tc>
+                  <a:txBody>
+                    <a:bodyPr/>
+                    <a:lstStyle/>
+                    <a:p>
+                      <a:pPr algn="ctr"/>
+                      <a:r>
+                        <a:rPr lang="en-US" dirty="0" smtClean="0"/>
+                        <a:t>0x802</a:t>
+                      </a:r>
+                      <a:endParaRPr lang="en-US" dirty="0"/>
+                    </a:p>
+                  </a:txBody>
+                  <a:tcPr/>
+                </a:tc>
+                <a:tc>
+                  <a:txBody>
+                    <a:bodyPr/>
+                    <a:lstStyle/>
+                    <a:p>
+                      <a:pPr algn="ctr"/>
+                      <a:endParaRPr lang="en-US" dirty="0"/>
+                    </a:p>
+                  </a:txBody>
+                  <a:tcPr/>
+                </a:tc>
+              </a:tr>
+              <a:tr h="370840">
+                <a:tc>
+                  <a:txBody>
+                    <a:bodyPr/>
+                    <a:lstStyle/>
+                    <a:p>
+                      <a:pPr algn="ctr"/>
+                      <a:r>
+                        <a:rPr lang="en-US" dirty="0" smtClean="0"/>
+                        <a:t>0x803</a:t>
+                      </a:r>
+                      <a:endParaRPr lang="en-US" dirty="0"/>
+                    </a:p>
+                  </a:txBody>
+                  <a:tcPr/>
+                </a:tc>
+                <a:tc>
+                  <a:txBody>
+                    <a:bodyPr/>
+                    <a:lstStyle/>
+                    <a:p>
+                      <a:pPr algn="ctr"/>
+                      <a:endParaRPr lang="en-US" dirty="0"/>
+                    </a:p>
+                  </a:txBody>
+                  <a:tcPr/>
+                </a:tc>
+              </a:tr>
+              <a:tr h="370840">
+                <a:tc>
+                  <a:txBody>
+                    <a:bodyPr/>
+                    <a:lstStyle/>
+                    <a:p>
+                      <a:pPr marL="0" marR="0" indent="0" algn="ctr" defTabSz="914400" rtl="0" eaLnBrk="1" fontAlgn="auto" latinLnBrk="0" hangingPunct="1">
+                        <a:lnSpc>
+                          <a:spcPct val="100000"/>
+                        </a:lnSpc>
+                        <a:spcBef>
+                          <a:spcPts val="0"/>
+                        </a:spcBef>
+                        <a:spcAft>
+                          <a:spcPts val="0"/>
+                        </a:spcAft>
+                        <a:buClrTx/>
+                        <a:buSzTx/>
+                        <a:buFontTx/>
+                        <a:buNone/>
+                        <a:tabLst/>
+                        <a:defRPr/>
+                      </a:pPr>
+                      <a:r>
+                        <a:rPr lang="en-US" dirty="0" smtClean="0"/>
+                        <a:t>0x804</a:t>
+                      </a:r>
+                    </a:p>
+                  </a:txBody>
+                  <a:tcPr/>
+                </a:tc>
+                <a:tc>
+                  <a:txBody>
+                    <a:bodyPr/>
+                    <a:lstStyle/>
+                    <a:p>
+                      <a:pPr algn="ctr"/>
+                      <a:endParaRPr lang="en-US" dirty="0"/>
+                    </a:p>
+                  </a:txBody>
+                  <a:tcPr/>
+                </a:tc>
+              </a:tr>
+              <a:tr h="370840">
+                <a:tc>
+                  <a:txBody>
+                    <a:bodyPr/>
+                    <a:lstStyle/>
+                    <a:p>
+                      <a:pPr marL="0" marR="0" indent="0" algn="ctr" defTabSz="914400" rtl="0" eaLnBrk="1" fontAlgn="auto" latinLnBrk="0" hangingPunct="1">
+                        <a:lnSpc>
+                          <a:spcPct val="100000"/>
+                        </a:lnSpc>
+                        <a:spcBef>
+                          <a:spcPts val="0"/>
+                        </a:spcBef>
+                        <a:spcAft>
+                          <a:spcPts val="0"/>
+                        </a:spcAft>
+                        <a:buClrTx/>
+                        <a:buSzTx/>
+                        <a:buFontTx/>
+                        <a:buNone/>
+                        <a:tabLst/>
+                        <a:defRPr/>
+                      </a:pPr>
+                      <a:r>
+                        <a:rPr lang="en-US" dirty="0" smtClean="0"/>
+                        <a:t>0x805</a:t>
+                      </a:r>
+                    </a:p>
+                  </a:txBody>
+                  <a:tcPr/>
+                </a:tc>
+                <a:tc>
+                  <a:txBody>
+                    <a:bodyPr/>
+                    <a:lstStyle/>
+                    <a:p>
+                      <a:pPr algn="ctr"/>
+                      <a:endParaRPr lang="en-US" dirty="0"/>
+                    </a:p>
+                  </a:txBody>
+                  <a:tcPr/>
+                </a:tc>
+              </a:tr>
+            </a:tbl>
+          </a:graphicData>
+        </a:graphic>
+      </p:graphicFrame>
+      <p:graphicFrame>
+        <p:nvGraphicFramePr>
+          <p:cNvPr id="6" name="Table 5"/>
+          <p:cNvGraphicFramePr>
+            <a:graphicFrameLocks noGrp="1"/>
+          </p:cNvGraphicFramePr>
+          <p:nvPr>
+            <p:extLst>
+              <p:ext uri="{D42A27DB-BD31-4B8C-83A1-F6EECF244321}">
+                <p14:modId xmlns:p14="http://schemas.microsoft.com/office/powerpoint/2010/main" val="106858067"/>
+              </p:ext>
+            </p:extLst>
+          </p:nvPr>
+        </p:nvGraphicFramePr>
+        <p:xfrm>
+          <a:off x="6943334" y="2708278"/>
+          <a:ext cx="2032000" cy="2595880"/>
+        </p:xfrm>
+        <a:graphic>
+          <a:graphicData uri="http://schemas.openxmlformats.org/drawingml/2006/table">
+            <a:tbl>
+              <a:tblPr firstRow="1" bandRow="1">
+                <a:tableStyleId>{21E4AEA4-8DFA-4A89-87EB-49C32662AFE0}</a:tableStyleId>
+              </a:tblPr>
+              <a:tblGrid>
+                <a:gridCol w="1016000"/>
+                <a:gridCol w="1016000"/>
+              </a:tblGrid>
+              <a:tr h="370840">
+                <a:tc>
+                  <a:txBody>
+                    <a:bodyPr/>
+                    <a:lstStyle/>
+                    <a:p>
+                      <a:pPr algn="ctr"/>
+                      <a:r>
+                        <a:rPr lang="en-US" dirty="0" err="1" smtClean="0"/>
+                        <a:t>Addr</a:t>
+                      </a:r>
+                      <a:endParaRPr lang="en-US" dirty="0"/>
+                    </a:p>
+                  </a:txBody>
+                  <a:tcPr/>
+                </a:tc>
+                <a:tc>
+                  <a:txBody>
+                    <a:bodyPr/>
+                    <a:lstStyle/>
+                    <a:p>
+                      <a:pPr algn="ctr"/>
+                      <a:r>
+                        <a:rPr lang="en-US" dirty="0" smtClean="0"/>
+                        <a:t>Value</a:t>
+                      </a:r>
+                      <a:endParaRPr lang="en-US" dirty="0"/>
+                    </a:p>
+                  </a:txBody>
+                  <a:tcPr/>
+                </a:tc>
+              </a:tr>
+              <a:tr h="370840">
+                <a:tc>
+                  <a:txBody>
+                    <a:bodyPr/>
+                    <a:lstStyle/>
+                    <a:p>
+                      <a:pPr algn="ctr"/>
+                      <a:r>
+                        <a:rPr lang="en-US" dirty="0" smtClean="0"/>
+                        <a:t>0x800</a:t>
+                      </a:r>
+                      <a:endParaRPr lang="en-US" dirty="0"/>
+                    </a:p>
+                  </a:txBody>
+                  <a:tcPr/>
+                </a:tc>
+                <a:tc>
+                  <a:txBody>
+                    <a:bodyPr/>
+                    <a:lstStyle/>
+                    <a:p>
+                      <a:pPr algn="ctr"/>
+                      <a:r>
+                        <a:rPr lang="en-US" dirty="0" smtClean="0"/>
+                        <a:t>0xFF</a:t>
+                      </a:r>
+                      <a:endParaRPr lang="en-US" dirty="0"/>
+                    </a:p>
+                  </a:txBody>
+                  <a:tcPr/>
+                </a:tc>
+              </a:tr>
+              <a:tr h="370840">
+                <a:tc>
+                  <a:txBody>
+                    <a:bodyPr/>
+                    <a:lstStyle/>
+                    <a:p>
+                      <a:pPr algn="ctr"/>
+                      <a:r>
+                        <a:rPr lang="en-US" dirty="0" smtClean="0"/>
+                        <a:t>0x801</a:t>
+                      </a:r>
+                      <a:endParaRPr lang="en-US" dirty="0"/>
+                    </a:p>
+                  </a:txBody>
+                  <a:tcPr/>
+                </a:tc>
+                <a:tc>
+                  <a:txBody>
+                    <a:bodyPr/>
+                    <a:lstStyle/>
+                    <a:p>
+                      <a:pPr algn="ctr"/>
+                      <a:endParaRPr lang="en-US" dirty="0"/>
+                    </a:p>
+                  </a:txBody>
+                  <a:tcPr/>
+                </a:tc>
+              </a:tr>
+              <a:tr h="370840">
+                <a:tc>
+                  <a:txBody>
+                    <a:bodyPr/>
+                    <a:lstStyle/>
+                    <a:p>
+                      <a:pPr algn="ctr"/>
+                      <a:r>
+                        <a:rPr lang="en-US" dirty="0" smtClean="0"/>
+                        <a:t>0x802</a:t>
+                      </a:r>
+                      <a:endParaRPr lang="en-US" dirty="0"/>
+                    </a:p>
+                  </a:txBody>
+                  <a:tcPr/>
+                </a:tc>
+                <a:tc>
+                  <a:txBody>
+                    <a:bodyPr/>
+                    <a:lstStyle/>
+                    <a:p>
+                      <a:pPr algn="ctr"/>
+                      <a:endParaRPr lang="en-US" dirty="0"/>
+                    </a:p>
+                  </a:txBody>
+                  <a:tcPr/>
+                </a:tc>
+              </a:tr>
+              <a:tr h="370840">
+                <a:tc>
+                  <a:txBody>
+                    <a:bodyPr/>
+                    <a:lstStyle/>
+                    <a:p>
+                      <a:pPr algn="ctr"/>
+                      <a:r>
+                        <a:rPr lang="en-US" dirty="0" smtClean="0"/>
+                        <a:t>0x803</a:t>
+                      </a:r>
+                      <a:endParaRPr lang="en-US" dirty="0"/>
+                    </a:p>
+                  </a:txBody>
+                  <a:tcPr/>
+                </a:tc>
+                <a:tc>
+                  <a:txBody>
+                    <a:bodyPr/>
+                    <a:lstStyle/>
+                    <a:p>
+                      <a:pPr algn="ctr"/>
+                      <a:endParaRPr lang="en-US" dirty="0"/>
+                    </a:p>
+                  </a:txBody>
+                  <a:tcPr/>
+                </a:tc>
+              </a:tr>
+              <a:tr h="370840">
+                <a:tc>
+                  <a:txBody>
+                    <a:bodyPr/>
+                    <a:lstStyle/>
+                    <a:p>
+                      <a:pPr marL="0" marR="0" indent="0" algn="ctr" defTabSz="914400" rtl="0" eaLnBrk="1" fontAlgn="auto" latinLnBrk="0" hangingPunct="1">
+                        <a:lnSpc>
+                          <a:spcPct val="100000"/>
+                        </a:lnSpc>
+                        <a:spcBef>
+                          <a:spcPts val="0"/>
+                        </a:spcBef>
+                        <a:spcAft>
+                          <a:spcPts val="0"/>
+                        </a:spcAft>
+                        <a:buClrTx/>
+                        <a:buSzTx/>
+                        <a:buFontTx/>
+                        <a:buNone/>
+                        <a:tabLst/>
+                        <a:defRPr/>
+                      </a:pPr>
+                      <a:r>
+                        <a:rPr lang="en-US" dirty="0" smtClean="0"/>
+                        <a:t>0x804</a:t>
+                      </a:r>
+                    </a:p>
+                  </a:txBody>
+                  <a:tcPr/>
+                </a:tc>
+                <a:tc>
+                  <a:txBody>
+                    <a:bodyPr/>
+                    <a:lstStyle/>
+                    <a:p>
+                      <a:pPr algn="ctr"/>
+                      <a:endParaRPr lang="en-US" dirty="0"/>
+                    </a:p>
+                  </a:txBody>
+                  <a:tcPr/>
+                </a:tc>
+              </a:tr>
+              <a:tr h="370840">
+                <a:tc>
+                  <a:txBody>
+                    <a:bodyPr/>
+                    <a:lstStyle/>
+                    <a:p>
+                      <a:pPr marL="0" marR="0" indent="0" algn="ctr" defTabSz="914400" rtl="0" eaLnBrk="1" fontAlgn="auto" latinLnBrk="0" hangingPunct="1">
+                        <a:lnSpc>
+                          <a:spcPct val="100000"/>
+                        </a:lnSpc>
+                        <a:spcBef>
+                          <a:spcPts val="0"/>
+                        </a:spcBef>
+                        <a:spcAft>
+                          <a:spcPts val="0"/>
+                        </a:spcAft>
+                        <a:buClrTx/>
+                        <a:buSzTx/>
+                        <a:buFontTx/>
+                        <a:buNone/>
+                        <a:tabLst/>
+                        <a:defRPr/>
+                      </a:pPr>
+                      <a:r>
+                        <a:rPr lang="en-US" dirty="0" smtClean="0"/>
+                        <a:t>0x805</a:t>
+                      </a:r>
+                    </a:p>
+                  </a:txBody>
+                  <a:tcPr/>
+                </a:tc>
+                <a:tc>
+                  <a:txBody>
+                    <a:bodyPr/>
+                    <a:lstStyle/>
+                    <a:p>
+                      <a:pPr algn="ctr"/>
+                      <a:endParaRPr lang="en-US" dirty="0"/>
+                    </a:p>
+                  </a:txBody>
+                  <a:tcPr/>
+                </a:tc>
+              </a:tr>
+            </a:tbl>
+          </a:graphicData>
+        </a:graphic>
+      </p:graphicFrame>
+      <p:graphicFrame>
+        <p:nvGraphicFramePr>
+          <p:cNvPr id="7" name="Table 6"/>
+          <p:cNvGraphicFramePr>
+            <a:graphicFrameLocks noGrp="1"/>
+          </p:cNvGraphicFramePr>
+          <p:nvPr>
+            <p:extLst>
+              <p:ext uri="{D42A27DB-BD31-4B8C-83A1-F6EECF244321}">
+                <p14:modId xmlns:p14="http://schemas.microsoft.com/office/powerpoint/2010/main" val="365589330"/>
+              </p:ext>
+            </p:extLst>
+          </p:nvPr>
+        </p:nvGraphicFramePr>
+        <p:xfrm>
+          <a:off x="6943335" y="2708279"/>
+          <a:ext cx="2032000" cy="2595880"/>
+        </p:xfrm>
+        <a:graphic>
+          <a:graphicData uri="http://schemas.openxmlformats.org/drawingml/2006/table">
+            <a:tbl>
+              <a:tblPr firstRow="1" bandRow="1">
+                <a:tableStyleId>{21E4AEA4-8DFA-4A89-87EB-49C32662AFE0}</a:tableStyleId>
+              </a:tblPr>
+              <a:tblGrid>
+                <a:gridCol w="1016000"/>
+                <a:gridCol w="1016000"/>
+              </a:tblGrid>
+              <a:tr h="370840">
+                <a:tc>
+                  <a:txBody>
+                    <a:bodyPr/>
+                    <a:lstStyle/>
+                    <a:p>
+                      <a:pPr algn="ctr"/>
+                      <a:r>
+                        <a:rPr lang="en-US" dirty="0" err="1" smtClean="0"/>
+                        <a:t>Addr</a:t>
+                      </a:r>
+                      <a:endParaRPr lang="en-US" dirty="0"/>
+                    </a:p>
+                  </a:txBody>
+                  <a:tcPr/>
+                </a:tc>
+                <a:tc>
+                  <a:txBody>
+                    <a:bodyPr/>
+                    <a:lstStyle/>
+                    <a:p>
+                      <a:pPr algn="ctr"/>
+                      <a:r>
+                        <a:rPr lang="en-US" dirty="0" smtClean="0"/>
+                        <a:t>Value</a:t>
+                      </a:r>
+                      <a:endParaRPr lang="en-US" dirty="0"/>
+                    </a:p>
+                  </a:txBody>
+                  <a:tcPr/>
+                </a:tc>
+              </a:tr>
+              <a:tr h="370840">
+                <a:tc>
+                  <a:txBody>
+                    <a:bodyPr/>
+                    <a:lstStyle/>
+                    <a:p>
+                      <a:pPr algn="ctr"/>
+                      <a:r>
+                        <a:rPr lang="en-US" dirty="0" smtClean="0"/>
+                        <a:t>0x800</a:t>
+                      </a:r>
+                      <a:endParaRPr lang="en-US" dirty="0"/>
+                    </a:p>
+                  </a:txBody>
+                  <a:tcPr/>
+                </a:tc>
+                <a:tc>
+                  <a:txBody>
+                    <a:bodyPr/>
+                    <a:lstStyle/>
+                    <a:p>
+                      <a:pPr algn="ctr"/>
+                      <a:r>
+                        <a:rPr lang="en-US" dirty="0" smtClean="0"/>
+                        <a:t>0xFF</a:t>
+                      </a:r>
+                      <a:endParaRPr lang="en-US" dirty="0"/>
+                    </a:p>
+                  </a:txBody>
+                  <a:tcPr/>
+                </a:tc>
+              </a:tr>
+              <a:tr h="370840">
+                <a:tc>
+                  <a:txBody>
+                    <a:bodyPr/>
+                    <a:lstStyle/>
+                    <a:p>
+                      <a:pPr algn="ctr"/>
+                      <a:r>
+                        <a:rPr lang="en-US" dirty="0" smtClean="0"/>
+                        <a:t>0x801</a:t>
+                      </a:r>
+                      <a:endParaRPr lang="en-US" dirty="0"/>
+                    </a:p>
+                  </a:txBody>
+                  <a:tcPr/>
+                </a:tc>
+                <a:tc>
+                  <a:txBody>
+                    <a:bodyPr/>
+                    <a:lstStyle/>
+                    <a:p>
+                      <a:pPr algn="ctr"/>
+                      <a:r>
+                        <a:rPr lang="en-US" dirty="0" smtClean="0"/>
+                        <a:t>0x23</a:t>
+                      </a:r>
+                      <a:endParaRPr lang="en-US" dirty="0"/>
+                    </a:p>
+                  </a:txBody>
+                  <a:tcPr/>
+                </a:tc>
+              </a:tr>
+              <a:tr h="370840">
+                <a:tc>
+                  <a:txBody>
+                    <a:bodyPr/>
+                    <a:lstStyle/>
+                    <a:p>
+                      <a:pPr algn="ctr"/>
+                      <a:r>
+                        <a:rPr lang="en-US" dirty="0" smtClean="0"/>
+                        <a:t>0x802</a:t>
+                      </a:r>
+                      <a:endParaRPr lang="en-US" dirty="0"/>
+                    </a:p>
+                  </a:txBody>
+                  <a:tcPr/>
+                </a:tc>
+                <a:tc>
+                  <a:txBody>
+                    <a:bodyPr/>
+                    <a:lstStyle/>
+                    <a:p>
+                      <a:pPr algn="ctr"/>
+                      <a:r>
+                        <a:rPr lang="en-US" dirty="0" smtClean="0"/>
+                        <a:t>0x56</a:t>
+                      </a:r>
+                      <a:endParaRPr lang="en-US" dirty="0"/>
+                    </a:p>
+                  </a:txBody>
+                  <a:tcPr/>
+                </a:tc>
+              </a:tr>
+              <a:tr h="370840">
+                <a:tc>
+                  <a:txBody>
+                    <a:bodyPr/>
+                    <a:lstStyle/>
+                    <a:p>
+                      <a:pPr algn="ctr"/>
+                      <a:r>
+                        <a:rPr lang="en-US" dirty="0" smtClean="0"/>
+                        <a:t>0x803</a:t>
+                      </a:r>
+                      <a:endParaRPr lang="en-US" dirty="0"/>
+                    </a:p>
+                  </a:txBody>
+                  <a:tcPr/>
+                </a:tc>
+                <a:tc>
+                  <a:txBody>
+                    <a:bodyPr/>
+                    <a:lstStyle/>
+                    <a:p>
+                      <a:pPr algn="ctr"/>
+                      <a:r>
+                        <a:rPr lang="en-US" dirty="0" smtClean="0"/>
+                        <a:t>0x89</a:t>
+                      </a:r>
+                      <a:endParaRPr lang="en-US" dirty="0"/>
+                    </a:p>
+                  </a:txBody>
+                  <a:tcPr/>
+                </a:tc>
+              </a:tr>
+              <a:tr h="370840">
+                <a:tc>
+                  <a:txBody>
+                    <a:bodyPr/>
+                    <a:lstStyle/>
+                    <a:p>
+                      <a:pPr marL="0" marR="0" indent="0" algn="ctr" defTabSz="914400" rtl="0" eaLnBrk="1" fontAlgn="auto" latinLnBrk="0" hangingPunct="1">
+                        <a:lnSpc>
+                          <a:spcPct val="100000"/>
+                        </a:lnSpc>
+                        <a:spcBef>
+                          <a:spcPts val="0"/>
+                        </a:spcBef>
+                        <a:spcAft>
+                          <a:spcPts val="0"/>
+                        </a:spcAft>
+                        <a:buClrTx/>
+                        <a:buSzTx/>
+                        <a:buFontTx/>
+                        <a:buNone/>
+                        <a:tabLst/>
+                        <a:defRPr/>
+                      </a:pPr>
+                      <a:r>
+                        <a:rPr lang="en-US" dirty="0" smtClean="0"/>
+                        <a:t>0x804</a:t>
+                      </a:r>
+                    </a:p>
+                  </a:txBody>
+                  <a:tcPr/>
+                </a:tc>
+                <a:tc>
+                  <a:txBody>
+                    <a:bodyPr/>
+                    <a:lstStyle/>
+                    <a:p>
+                      <a:pPr algn="ctr"/>
+                      <a:endParaRPr lang="en-US" dirty="0"/>
+                    </a:p>
+                  </a:txBody>
+                  <a:tcPr/>
+                </a:tc>
+              </a:tr>
+              <a:tr h="370840">
+                <a:tc>
+                  <a:txBody>
+                    <a:bodyPr/>
+                    <a:lstStyle/>
+                    <a:p>
+                      <a:pPr marL="0" marR="0" indent="0" algn="ctr" defTabSz="914400" rtl="0" eaLnBrk="1" fontAlgn="auto" latinLnBrk="0" hangingPunct="1">
+                        <a:lnSpc>
+                          <a:spcPct val="100000"/>
+                        </a:lnSpc>
+                        <a:spcBef>
+                          <a:spcPts val="0"/>
+                        </a:spcBef>
+                        <a:spcAft>
+                          <a:spcPts val="0"/>
+                        </a:spcAft>
+                        <a:buClrTx/>
+                        <a:buSzTx/>
+                        <a:buFontTx/>
+                        <a:buNone/>
+                        <a:tabLst/>
+                        <a:defRPr/>
+                      </a:pPr>
+                      <a:r>
+                        <a:rPr lang="en-US" dirty="0" smtClean="0"/>
+                        <a:t>0x805</a:t>
+                      </a:r>
+                    </a:p>
+                  </a:txBody>
+                  <a:tcPr/>
+                </a:tc>
+                <a:tc>
+                  <a:txBody>
+                    <a:bodyPr/>
+                    <a:lstStyle/>
+                    <a:p>
+                      <a:pPr algn="ctr"/>
+                      <a:endParaRPr lang="en-US" dirty="0"/>
+                    </a:p>
+                  </a:txBody>
+                  <a:tcPr/>
+                </a:tc>
+              </a:tr>
+            </a:tbl>
+          </a:graphicData>
+        </a:graphic>
+      </p:graphicFrame>
+      <p:graphicFrame>
+        <p:nvGraphicFramePr>
+          <p:cNvPr id="8" name="Table 7"/>
+          <p:cNvGraphicFramePr>
+            <a:graphicFrameLocks noGrp="1"/>
+          </p:cNvGraphicFramePr>
+          <p:nvPr>
+            <p:extLst>
+              <p:ext uri="{D42A27DB-BD31-4B8C-83A1-F6EECF244321}">
+                <p14:modId xmlns:p14="http://schemas.microsoft.com/office/powerpoint/2010/main" val="1442642162"/>
+              </p:ext>
+            </p:extLst>
+          </p:nvPr>
+        </p:nvGraphicFramePr>
+        <p:xfrm>
+          <a:off x="6934874" y="2716751"/>
+          <a:ext cx="2032000" cy="2595880"/>
+        </p:xfrm>
+        <a:graphic>
+          <a:graphicData uri="http://schemas.openxmlformats.org/drawingml/2006/table">
+            <a:tbl>
+              <a:tblPr firstRow="1" bandRow="1">
+                <a:tableStyleId>{21E4AEA4-8DFA-4A89-87EB-49C32662AFE0}</a:tableStyleId>
               </a:tblPr>
               <a:tblGrid>
                 <a:gridCol w="1016000"/>
@@ -11329,7 +12601,387 @@
   <p:timing>
     <p:tnLst>
       <p:par>
-        <p:cTn id="1" dur="indefinite" restart="never" nodeType="tmRoot"/>
+        <p:cTn id="1" dur="indefinite" restart="never" nodeType="tmRoot">
+          <p:childTnLst>
+            <p:seq concurrent="1" nextAc="seek">
+              <p:cTn id="2" dur="indefinite" nodeType="mainSeq">
+                <p:childTnLst>
+                  <p:par>
+                    <p:cTn id="3" fill="hold">
+                      <p:stCondLst>
+                        <p:cond delay="indefinite"/>
+                      </p:stCondLst>
+                      <p:childTnLst>
+                        <p:par>
+                          <p:cTn id="4" fill="hold">
+                            <p:stCondLst>
+                              <p:cond delay="0"/>
+                            </p:stCondLst>
+                            <p:childTnLst>
+                              <p:par>
+                                <p:cTn id="5" presetID="1" presetClass="entr" presetSubtype="0" fill="hold" nodeType="clickEffect">
+                                  <p:stCondLst>
+                                    <p:cond delay="0"/>
+                                  </p:stCondLst>
+                                  <p:childTnLst>
+                                    <p:set>
+                                      <p:cBhvr>
+                                        <p:cTn id="6" dur="1" fill="hold">
+                                          <p:stCondLst>
+                                            <p:cond delay="0"/>
+                                          </p:stCondLst>
+                                        </p:cTn>
+                                        <p:tgtEl>
+                                          <p:spTgt spid="6"/>
+                                        </p:tgtEl>
+                                        <p:attrNameLst>
+                                          <p:attrName>style.visibility</p:attrName>
+                                        </p:attrNameLst>
+                                      </p:cBhvr>
+                                      <p:to>
+                                        <p:strVal val="visible"/>
+                                      </p:to>
+                                    </p:set>
+                                  </p:childTnLst>
+                                </p:cTn>
+                              </p:par>
+                            </p:childTnLst>
+                          </p:cTn>
+                        </p:par>
+                      </p:childTnLst>
+                    </p:cTn>
+                  </p:par>
+                  <p:par>
+                    <p:cTn id="7" fill="hold">
+                      <p:stCondLst>
+                        <p:cond delay="indefinite"/>
+                      </p:stCondLst>
+                      <p:childTnLst>
+                        <p:par>
+                          <p:cTn id="8" fill="hold">
+                            <p:stCondLst>
+                              <p:cond delay="0"/>
+                            </p:stCondLst>
+                            <p:childTnLst>
+                              <p:par>
+                                <p:cTn id="9" presetID="1" presetClass="entr" presetSubtype="0" fill="hold" nodeType="clickEffect">
+                                  <p:stCondLst>
+                                    <p:cond delay="0"/>
+                                  </p:stCondLst>
+                                  <p:childTnLst>
+                                    <p:set>
+                                      <p:cBhvr>
+                                        <p:cTn id="10" dur="1" fill="hold">
+                                          <p:stCondLst>
+                                            <p:cond delay="0"/>
+                                          </p:stCondLst>
+                                        </p:cTn>
+                                        <p:tgtEl>
+                                          <p:spTgt spid="7"/>
+                                        </p:tgtEl>
+                                        <p:attrNameLst>
+                                          <p:attrName>style.visibility</p:attrName>
+                                        </p:attrNameLst>
+                                      </p:cBhvr>
+                                      <p:to>
+                                        <p:strVal val="visible"/>
+                                      </p:to>
+                                    </p:set>
+                                  </p:childTnLst>
+                                </p:cTn>
+                              </p:par>
+                            </p:childTnLst>
+                          </p:cTn>
+                        </p:par>
+                      </p:childTnLst>
+                    </p:cTn>
+                  </p:par>
+                  <p:par>
+                    <p:cTn id="11" fill="hold">
+                      <p:stCondLst>
+                        <p:cond delay="indefinite"/>
+                      </p:stCondLst>
+                      <p:childTnLst>
+                        <p:par>
+                          <p:cTn id="12" fill="hold">
+                            <p:stCondLst>
+                              <p:cond delay="0"/>
+                            </p:stCondLst>
+                            <p:childTnLst>
+                              <p:par>
+                                <p:cTn id="13" presetID="1" presetClass="entr" presetSubtype="0" fill="hold" nodeType="clickEffect">
+                                  <p:stCondLst>
+                                    <p:cond delay="0"/>
+                                  </p:stCondLst>
+                                  <p:childTnLst>
+                                    <p:set>
+                                      <p:cBhvr>
+                                        <p:cTn id="14" dur="1" fill="hold">
+                                          <p:stCondLst>
+                                            <p:cond delay="0"/>
+                                          </p:stCondLst>
+                                        </p:cTn>
+                                        <p:tgtEl>
+                                          <p:spTgt spid="8"/>
+                                        </p:tgtEl>
+                                        <p:attrNameLst>
+                                          <p:attrName>style.visibility</p:attrName>
+                                        </p:attrNameLst>
+                                      </p:cBhvr>
+                                      <p:to>
+                                        <p:strVal val="visible"/>
+                                      </p:to>
+                                    </p:set>
+                                  </p:childTnLst>
+                                </p:cTn>
+                              </p:par>
+                            </p:childTnLst>
+                          </p:cTn>
+                        </p:par>
+                      </p:childTnLst>
+                    </p:cTn>
+                  </p:par>
+                  <p:par>
+                    <p:cTn id="15" fill="hold">
+                      <p:stCondLst>
+                        <p:cond delay="indefinite"/>
+                      </p:stCondLst>
+                      <p:childTnLst>
+                        <p:par>
+                          <p:cTn id="16" fill="hold">
+                            <p:stCondLst>
+                              <p:cond delay="0"/>
+                            </p:stCondLst>
+                            <p:childTnLst>
+                              <p:par>
+                                <p:cTn id="17" presetID="1" presetClass="entr" presetSubtype="0" fill="hold" nodeType="clickEffect">
+                                  <p:stCondLst>
+                                    <p:cond delay="0"/>
+                                  </p:stCondLst>
+                                  <p:childTnLst>
+                                    <p:set>
+                                      <p:cBhvr>
+                                        <p:cTn id="18" dur="1" fill="hold">
+                                          <p:stCondLst>
+                                            <p:cond delay="0"/>
+                                          </p:stCondLst>
+                                        </p:cTn>
+                                        <p:tgtEl>
+                                          <p:spTgt spid="3">
+                                            <p:txEl>
+                                              <p:pRg st="9" end="9"/>
+                                            </p:txEl>
+                                          </p:spTgt>
+                                        </p:tgtEl>
+                                        <p:attrNameLst>
+                                          <p:attrName>style.visibility</p:attrName>
+                                        </p:attrNameLst>
+                                      </p:cBhvr>
+                                      <p:to>
+                                        <p:strVal val="visible"/>
+                                      </p:to>
+                                    </p:set>
+                                  </p:childTnLst>
+                                </p:cTn>
+                              </p:par>
+                              <p:par>
+                                <p:cTn id="19" presetID="1" presetClass="entr" presetSubtype="0" fill="hold" nodeType="withEffect">
+                                  <p:stCondLst>
+                                    <p:cond delay="0"/>
+                                  </p:stCondLst>
+                                  <p:childTnLst>
+                                    <p:set>
+                                      <p:cBhvr>
+                                        <p:cTn id="20" dur="1" fill="hold">
+                                          <p:stCondLst>
+                                            <p:cond delay="0"/>
+                                          </p:stCondLst>
+                                        </p:cTn>
+                                        <p:tgtEl>
+                                          <p:spTgt spid="3">
+                                            <p:txEl>
+                                              <p:pRg st="10" end="10"/>
+                                            </p:txEl>
+                                          </p:spTgt>
+                                        </p:tgtEl>
+                                        <p:attrNameLst>
+                                          <p:attrName>style.visibility</p:attrName>
+                                        </p:attrNameLst>
+                                      </p:cBhvr>
+                                      <p:to>
+                                        <p:strVal val="visible"/>
+                                      </p:to>
+                                    </p:set>
+                                  </p:childTnLst>
+                                </p:cTn>
+                              </p:par>
+                              <p:par>
+                                <p:cTn id="21" presetID="1" presetClass="entr" presetSubtype="0" fill="hold" nodeType="withEffect">
+                                  <p:stCondLst>
+                                    <p:cond delay="0"/>
+                                  </p:stCondLst>
+                                  <p:childTnLst>
+                                    <p:set>
+                                      <p:cBhvr>
+                                        <p:cTn id="22" dur="1" fill="hold">
+                                          <p:stCondLst>
+                                            <p:cond delay="0"/>
+                                          </p:stCondLst>
+                                        </p:cTn>
+                                        <p:tgtEl>
+                                          <p:spTgt spid="3">
+                                            <p:txEl>
+                                              <p:pRg st="11" end="11"/>
+                                            </p:txEl>
+                                          </p:spTgt>
+                                        </p:tgtEl>
+                                        <p:attrNameLst>
+                                          <p:attrName>style.visibility</p:attrName>
+                                        </p:attrNameLst>
+                                      </p:cBhvr>
+                                      <p:to>
+                                        <p:strVal val="visible"/>
+                                      </p:to>
+                                    </p:set>
+                                  </p:childTnLst>
+                                </p:cTn>
+                              </p:par>
+                            </p:childTnLst>
+                          </p:cTn>
+                        </p:par>
+                      </p:childTnLst>
+                    </p:cTn>
+                  </p:par>
+                  <p:par>
+                    <p:cTn id="23" fill="hold">
+                      <p:stCondLst>
+                        <p:cond delay="indefinite"/>
+                      </p:stCondLst>
+                      <p:childTnLst>
+                        <p:par>
+                          <p:cTn id="24" fill="hold">
+                            <p:stCondLst>
+                              <p:cond delay="0"/>
+                            </p:stCondLst>
+                            <p:childTnLst>
+                              <p:par>
+                                <p:cTn id="25" presetID="1" presetClass="entr" presetSubtype="0" fill="hold" nodeType="clickEffect">
+                                  <p:stCondLst>
+                                    <p:cond delay="0"/>
+                                  </p:stCondLst>
+                                  <p:childTnLst>
+                                    <p:set>
+                                      <p:cBhvr>
+                                        <p:cTn id="26" dur="1" fill="hold">
+                                          <p:stCondLst>
+                                            <p:cond delay="0"/>
+                                          </p:stCondLst>
+                                        </p:cTn>
+                                        <p:tgtEl>
+                                          <p:spTgt spid="3">
+                                            <p:txEl>
+                                              <p:pRg st="13" end="13"/>
+                                            </p:txEl>
+                                          </p:spTgt>
+                                        </p:tgtEl>
+                                        <p:attrNameLst>
+                                          <p:attrName>style.visibility</p:attrName>
+                                        </p:attrNameLst>
+                                      </p:cBhvr>
+                                      <p:to>
+                                        <p:strVal val="visible"/>
+                                      </p:to>
+                                    </p:set>
+                                  </p:childTnLst>
+                                </p:cTn>
+                              </p:par>
+                              <p:par>
+                                <p:cTn id="27" presetID="1" presetClass="entr" presetSubtype="0" fill="hold" nodeType="withEffect">
+                                  <p:stCondLst>
+                                    <p:cond delay="0"/>
+                                  </p:stCondLst>
+                                  <p:childTnLst>
+                                    <p:set>
+                                      <p:cBhvr>
+                                        <p:cTn id="28" dur="1" fill="hold">
+                                          <p:stCondLst>
+                                            <p:cond delay="0"/>
+                                          </p:stCondLst>
+                                        </p:cTn>
+                                        <p:tgtEl>
+                                          <p:spTgt spid="3">
+                                            <p:txEl>
+                                              <p:pRg st="14" end="14"/>
+                                            </p:txEl>
+                                          </p:spTgt>
+                                        </p:tgtEl>
+                                        <p:attrNameLst>
+                                          <p:attrName>style.visibility</p:attrName>
+                                        </p:attrNameLst>
+                                      </p:cBhvr>
+                                      <p:to>
+                                        <p:strVal val="visible"/>
+                                      </p:to>
+                                    </p:set>
+                                  </p:childTnLst>
+                                </p:cTn>
+                              </p:par>
+                              <p:par>
+                                <p:cTn id="29" presetID="1" presetClass="entr" presetSubtype="0" fill="hold" nodeType="withEffect">
+                                  <p:stCondLst>
+                                    <p:cond delay="0"/>
+                                  </p:stCondLst>
+                                  <p:childTnLst>
+                                    <p:set>
+                                      <p:cBhvr>
+                                        <p:cTn id="30" dur="1" fill="hold">
+                                          <p:stCondLst>
+                                            <p:cond delay="0"/>
+                                          </p:stCondLst>
+                                        </p:cTn>
+                                        <p:tgtEl>
+                                          <p:spTgt spid="3">
+                                            <p:txEl>
+                                              <p:pRg st="15" end="15"/>
+                                            </p:txEl>
+                                          </p:spTgt>
+                                        </p:tgtEl>
+                                        <p:attrNameLst>
+                                          <p:attrName>style.visibility</p:attrName>
+                                        </p:attrNameLst>
+                                      </p:cBhvr>
+                                      <p:to>
+                                        <p:strVal val="visible"/>
+                                      </p:to>
+                                    </p:set>
+                                  </p:childTnLst>
+                                </p:cTn>
+                              </p:par>
+                            </p:childTnLst>
+                          </p:cTn>
+                        </p:par>
+                      </p:childTnLst>
+                    </p:cTn>
+                  </p:par>
+                </p:childTnLst>
+              </p:cTn>
+              <p:prevCondLst>
+                <p:cond evt="onPrev" delay="0">
+                  <p:tgtEl>
+                    <p:sldTgt/>
+                  </p:tgtEl>
+                </p:cond>
+              </p:prevCondLst>
+              <p:nextCondLst>
+                <p:cond evt="onNext" delay="0">
+                  <p:tgtEl>
+                    <p:sldTgt/>
+                  </p:tgtEl>
+                </p:cond>
+              </p:nextCondLst>
+            </p:seq>
+          </p:childTnLst>
+        </p:cTn>
       </p:par>
     </p:tnLst>
   </p:timing>

</xml_diff>

<commit_message>
Added answers to last pointer example in slides
</commit_message>
<xml_diff>
--- a/notes/L21/Lsn21.pptx
+++ b/notes/L21/Lsn21.pptx
@@ -5970,7 +5970,7 @@
           <p:nvPr>
             <p:extLst>
               <p:ext uri="{D42A27DB-BD31-4B8C-83A1-F6EECF244321}">
-                <p14:modId xmlns:p14="http://schemas.microsoft.com/office/powerpoint/2010/main" val="2386029260"/>
+                <p14:modId xmlns:p14="http://schemas.microsoft.com/office/powerpoint/2010/main" val="1670787775"/>
               </p:ext>
             </p:extLst>
           </p:nvPr>
@@ -6043,10 +6043,6 @@
                     <a:lstStyle/>
                     <a:p>
                       <a:pPr algn="ctr"/>
-                      <a:r>
-                        <a:rPr lang="en-US" dirty="0" smtClean="0"/>
-                        <a:t>34</a:t>
-                      </a:r>
                       <a:endParaRPr lang="en-US" dirty="0"/>
                     </a:p>
                   </a:txBody>
@@ -6075,10 +6071,6 @@
                     <a:lstStyle/>
                     <a:p>
                       <a:pPr algn="ctr"/>
-                      <a:r>
-                        <a:rPr lang="en-US" dirty="0" smtClean="0"/>
-                        <a:t>12</a:t>
-                      </a:r>
                       <a:endParaRPr lang="en-US" dirty="0"/>
                     </a:p>
                   </a:txBody>
@@ -6107,10 +6099,6 @@
                     <a:lstStyle/>
                     <a:p>
                       <a:pPr algn="ctr"/>
-                      <a:r>
-                        <a:rPr lang="en-US" dirty="0" smtClean="0"/>
-                        <a:t>78</a:t>
-                      </a:r>
                       <a:endParaRPr lang="en-US" dirty="0"/>
                     </a:p>
                   </a:txBody>
@@ -6139,10 +6127,6 @@
                     <a:lstStyle/>
                     <a:p>
                       <a:pPr algn="ctr"/>
-                      <a:r>
-                        <a:rPr lang="en-US" dirty="0" smtClean="0"/>
-                        <a:t>56</a:t>
-                      </a:r>
                       <a:endParaRPr lang="en-US" dirty="0"/>
                     </a:p>
                   </a:txBody>
@@ -12588,6 +12572,322 @@
           </a:graphicData>
         </a:graphic>
       </p:graphicFrame>
+      <p:sp>
+        <p:nvSpPr>
+          <p:cNvPr id="4" name="TextBox 3"/>
+          <p:cNvSpPr txBox="1"/>
+          <p:nvPr/>
+        </p:nvSpPr>
+        <p:spPr>
+          <a:xfrm>
+            <a:off x="1625599" y="2676955"/>
+            <a:ext cx="1634067" cy="307777"/>
+          </a:xfrm>
+          <a:prstGeom prst="rect">
+            <a:avLst/>
+          </a:prstGeom>
+          <a:noFill/>
+        </p:spPr>
+        <p:txBody>
+          <a:bodyPr wrap="square" rtlCol="0">
+            <a:spAutoFit/>
+          </a:bodyPr>
+          <a:lstStyle/>
+          <a:p>
+            <a:r>
+              <a:rPr lang="en-US" sz="1400" b="1" kern="0" dirty="0">
+                <a:solidFill>
+                  <a:srgbClr val="00B050"/>
+                </a:solidFill>
+                <a:latin typeface="Courier New" pitchFamily="49" charset="0"/>
+                <a:cs typeface="Courier New" pitchFamily="49" charset="0"/>
+              </a:rPr>
+              <a:t>// </a:t>
+            </a:r>
+            <a:r>
+              <a:rPr lang="en-US" sz="1400" b="1" kern="0" dirty="0" smtClean="0">
+                <a:solidFill>
+                  <a:srgbClr val="00B050"/>
+                </a:solidFill>
+                <a:latin typeface="Courier New" pitchFamily="49" charset="0"/>
+                <a:cs typeface="Courier New" pitchFamily="49" charset="0"/>
+              </a:rPr>
+              <a:t>x = 0x89</a:t>
+            </a:r>
+            <a:endParaRPr lang="en-US" dirty="0"/>
+          </a:p>
+        </p:txBody>
+      </p:sp>
+      <p:sp>
+        <p:nvSpPr>
+          <p:cNvPr id="10" name="TextBox 9"/>
+          <p:cNvSpPr txBox="1"/>
+          <p:nvPr/>
+        </p:nvSpPr>
+        <p:spPr>
+          <a:xfrm>
+            <a:off x="2311399" y="3396621"/>
+            <a:ext cx="3124201" cy="307777"/>
+          </a:xfrm>
+          <a:prstGeom prst="rect">
+            <a:avLst/>
+          </a:prstGeom>
+          <a:noFill/>
+        </p:spPr>
+        <p:txBody>
+          <a:bodyPr wrap="square" rtlCol="0">
+            <a:spAutoFit/>
+          </a:bodyPr>
+          <a:lstStyle/>
+          <a:p>
+            <a:r>
+              <a:rPr lang="en-US" sz="1400" b="1" kern="0" dirty="0">
+                <a:solidFill>
+                  <a:srgbClr val="00B050"/>
+                </a:solidFill>
+                <a:latin typeface="Courier New" pitchFamily="49" charset="0"/>
+                <a:cs typeface="Courier New" pitchFamily="49" charset="0"/>
+              </a:rPr>
+              <a:t>// </a:t>
+            </a:r>
+            <a:r>
+              <a:rPr lang="en-US" sz="1400" b="1" kern="0" dirty="0" err="1" smtClean="0">
+                <a:solidFill>
+                  <a:srgbClr val="00B050"/>
+                </a:solidFill>
+                <a:latin typeface="Courier New" pitchFamily="49" charset="0"/>
+                <a:cs typeface="Courier New" pitchFamily="49" charset="0"/>
+              </a:rPr>
+              <a:t>letter_ptr</a:t>
+            </a:r>
+            <a:r>
+              <a:rPr lang="en-US" sz="1400" b="1" kern="0" dirty="0" smtClean="0">
+                <a:solidFill>
+                  <a:srgbClr val="00B050"/>
+                </a:solidFill>
+                <a:latin typeface="Courier New" pitchFamily="49" charset="0"/>
+                <a:cs typeface="Courier New" pitchFamily="49" charset="0"/>
+              </a:rPr>
+              <a:t> = 0x0801</a:t>
+            </a:r>
+            <a:endParaRPr lang="en-US" dirty="0"/>
+          </a:p>
+        </p:txBody>
+      </p:sp>
+      <p:sp>
+        <p:nvSpPr>
+          <p:cNvPr id="11" name="TextBox 10"/>
+          <p:cNvSpPr txBox="1"/>
+          <p:nvPr/>
+        </p:nvSpPr>
+        <p:spPr>
+          <a:xfrm>
+            <a:off x="2751669" y="3677508"/>
+            <a:ext cx="3124201" cy="307777"/>
+          </a:xfrm>
+          <a:prstGeom prst="rect">
+            <a:avLst/>
+          </a:prstGeom>
+          <a:noFill/>
+        </p:spPr>
+        <p:txBody>
+          <a:bodyPr wrap="square" rtlCol="0">
+            <a:spAutoFit/>
+          </a:bodyPr>
+          <a:lstStyle/>
+          <a:p>
+            <a:r>
+              <a:rPr lang="en-US" sz="1400" b="1" kern="0" dirty="0">
+                <a:solidFill>
+                  <a:srgbClr val="00B050"/>
+                </a:solidFill>
+                <a:latin typeface="Courier New" pitchFamily="49" charset="0"/>
+                <a:cs typeface="Courier New" pitchFamily="49" charset="0"/>
+              </a:rPr>
+              <a:t>// </a:t>
+            </a:r>
+            <a:r>
+              <a:rPr lang="en-US" sz="1400" b="1" kern="0" dirty="0" smtClean="0">
+                <a:solidFill>
+                  <a:srgbClr val="00B050"/>
+                </a:solidFill>
+                <a:latin typeface="Courier New" pitchFamily="49" charset="0"/>
+                <a:cs typeface="Courier New" pitchFamily="49" charset="0"/>
+              </a:rPr>
+              <a:t>x = 0x89</a:t>
+            </a:r>
+            <a:endParaRPr lang="en-US" dirty="0"/>
+          </a:p>
+        </p:txBody>
+      </p:sp>
+      <p:sp>
+        <p:nvSpPr>
+          <p:cNvPr id="12" name="TextBox 11"/>
+          <p:cNvSpPr txBox="1"/>
+          <p:nvPr/>
+        </p:nvSpPr>
+        <p:spPr>
+          <a:xfrm>
+            <a:off x="2726268" y="3926016"/>
+            <a:ext cx="3632199" cy="307777"/>
+          </a:xfrm>
+          <a:prstGeom prst="rect">
+            <a:avLst/>
+          </a:prstGeom>
+          <a:noFill/>
+        </p:spPr>
+        <p:txBody>
+          <a:bodyPr wrap="square" rtlCol="0">
+            <a:spAutoFit/>
+          </a:bodyPr>
+          <a:lstStyle/>
+          <a:p>
+            <a:r>
+              <a:rPr lang="en-US" sz="1400" b="1" kern="0" dirty="0">
+                <a:solidFill>
+                  <a:srgbClr val="00B050"/>
+                </a:solidFill>
+                <a:latin typeface="Courier New" pitchFamily="49" charset="0"/>
+                <a:cs typeface="Courier New" pitchFamily="49" charset="0"/>
+              </a:rPr>
+              <a:t>// </a:t>
+            </a:r>
+            <a:r>
+              <a:rPr lang="en-US" sz="1400" b="1" kern="0" dirty="0" smtClean="0">
+                <a:solidFill>
+                  <a:srgbClr val="00B050"/>
+                </a:solidFill>
+                <a:latin typeface="Courier New" pitchFamily="49" charset="0"/>
+                <a:cs typeface="Courier New" pitchFamily="49" charset="0"/>
+              </a:rPr>
+              <a:t>same as x = </a:t>
+            </a:r>
+            <a:r>
+              <a:rPr lang="en-US" sz="1400" b="1" kern="0" dirty="0" err="1" smtClean="0">
+                <a:solidFill>
+                  <a:srgbClr val="00B050"/>
+                </a:solidFill>
+                <a:latin typeface="Courier New" pitchFamily="49" charset="0"/>
+                <a:cs typeface="Courier New" pitchFamily="49" charset="0"/>
+              </a:rPr>
+              <a:t>letter_ptr</a:t>
+            </a:r>
+            <a:r>
+              <a:rPr lang="en-US" sz="1400" b="1" kern="0" dirty="0" smtClean="0">
+                <a:solidFill>
+                  <a:srgbClr val="00B050"/>
+                </a:solidFill>
+                <a:latin typeface="Courier New" pitchFamily="49" charset="0"/>
+                <a:cs typeface="Courier New" pitchFamily="49" charset="0"/>
+              </a:rPr>
+              <a:t>[2]</a:t>
+            </a:r>
+            <a:endParaRPr lang="en-US" dirty="0"/>
+          </a:p>
+        </p:txBody>
+      </p:sp>
+      <p:sp>
+        <p:nvSpPr>
+          <p:cNvPr id="13" name="TextBox 12"/>
+          <p:cNvSpPr txBox="1"/>
+          <p:nvPr/>
+        </p:nvSpPr>
+        <p:spPr>
+          <a:xfrm>
+            <a:off x="2311399" y="4421088"/>
+            <a:ext cx="3124201" cy="307777"/>
+          </a:xfrm>
+          <a:prstGeom prst="rect">
+            <a:avLst/>
+          </a:prstGeom>
+          <a:noFill/>
+        </p:spPr>
+        <p:txBody>
+          <a:bodyPr wrap="square" rtlCol="0">
+            <a:spAutoFit/>
+          </a:bodyPr>
+          <a:lstStyle/>
+          <a:p>
+            <a:r>
+              <a:rPr lang="en-US" sz="1400" b="1" kern="0" dirty="0">
+                <a:solidFill>
+                  <a:srgbClr val="00B050"/>
+                </a:solidFill>
+                <a:latin typeface="Courier New" pitchFamily="49" charset="0"/>
+                <a:cs typeface="Courier New" pitchFamily="49" charset="0"/>
+              </a:rPr>
+              <a:t>// </a:t>
+            </a:r>
+            <a:r>
+              <a:rPr lang="en-US" sz="1400" b="1" kern="0" dirty="0" err="1" smtClean="0">
+                <a:solidFill>
+                  <a:srgbClr val="00B050"/>
+                </a:solidFill>
+                <a:latin typeface="Courier New" pitchFamily="49" charset="0"/>
+                <a:cs typeface="Courier New" pitchFamily="49" charset="0"/>
+              </a:rPr>
+              <a:t>letter_ptr</a:t>
+            </a:r>
+            <a:r>
+              <a:rPr lang="en-US" sz="1400" b="1" kern="0" dirty="0" smtClean="0">
+                <a:solidFill>
+                  <a:srgbClr val="00B050"/>
+                </a:solidFill>
+                <a:latin typeface="Courier New" pitchFamily="49" charset="0"/>
+                <a:cs typeface="Courier New" pitchFamily="49" charset="0"/>
+              </a:rPr>
+              <a:t> = 0x0800</a:t>
+            </a:r>
+            <a:endParaRPr lang="en-US" dirty="0"/>
+          </a:p>
+        </p:txBody>
+      </p:sp>
+      <p:sp>
+        <p:nvSpPr>
+          <p:cNvPr id="14" name="TextBox 13"/>
+          <p:cNvSpPr txBox="1"/>
+          <p:nvPr/>
+        </p:nvSpPr>
+        <p:spPr>
+          <a:xfrm>
+            <a:off x="2311399" y="5035149"/>
+            <a:ext cx="3632199" cy="307777"/>
+          </a:xfrm>
+          <a:prstGeom prst="rect">
+            <a:avLst/>
+          </a:prstGeom>
+          <a:noFill/>
+        </p:spPr>
+        <p:txBody>
+          <a:bodyPr wrap="square" rtlCol="0">
+            <a:spAutoFit/>
+          </a:bodyPr>
+          <a:lstStyle/>
+          <a:p>
+            <a:r>
+              <a:rPr lang="en-US" sz="1400" b="1" kern="0" dirty="0">
+                <a:solidFill>
+                  <a:srgbClr val="00B050"/>
+                </a:solidFill>
+                <a:latin typeface="Courier New" pitchFamily="49" charset="0"/>
+                <a:cs typeface="Courier New" pitchFamily="49" charset="0"/>
+              </a:rPr>
+              <a:t>// </a:t>
+            </a:r>
+            <a:r>
+              <a:rPr lang="en-US" sz="1400" b="1" kern="0" dirty="0" smtClean="0">
+                <a:solidFill>
+                  <a:srgbClr val="00B050"/>
+                </a:solidFill>
+                <a:latin typeface="Courier New" pitchFamily="49" charset="0"/>
+                <a:cs typeface="Courier New" pitchFamily="49" charset="0"/>
+              </a:rPr>
+              <a:t>y[2] = *(0x800 + 1) = 0x23</a:t>
+            </a:r>
+            <a:endParaRPr lang="en-US" dirty="0"/>
+          </a:p>
+        </p:txBody>
+      </p:sp>
     </p:spTree>
     <p:extLst>
       <p:ext uri="{BB962C8B-B14F-4D97-AF65-F5344CB8AC3E}">
@@ -12735,26 +13035,39 @@
                                   </p:childTnLst>
                                 </p:cTn>
                               </p:par>
-                            </p:childTnLst>
-                          </p:cTn>
-                        </p:par>
-                      </p:childTnLst>
-                    </p:cTn>
-                  </p:par>
-                  <p:par>
-                    <p:cTn id="15" fill="hold">
-                      <p:stCondLst>
-                        <p:cond delay="indefinite"/>
-                      </p:stCondLst>
-                      <p:childTnLst>
-                        <p:par>
-                          <p:cTn id="16" fill="hold">
-                            <p:stCondLst>
-                              <p:cond delay="0"/>
-                            </p:stCondLst>
-                            <p:childTnLst>
                               <p:par>
-                                <p:cTn id="17" presetID="1" presetClass="entr" presetSubtype="0" fill="hold" nodeType="clickEffect">
+                                <p:cTn id="15" presetID="1" presetClass="entr" presetSubtype="0" fill="hold" nodeType="withEffect">
+                                  <p:stCondLst>
+                                    <p:cond delay="0"/>
+                                  </p:stCondLst>
+                                  <p:childTnLst>
+                                    <p:set>
+                                      <p:cBhvr>
+                                        <p:cTn id="16" dur="1" fill="hold">
+                                          <p:stCondLst>
+                                            <p:cond delay="0"/>
+                                          </p:stCondLst>
+                                        </p:cTn>
+                                        <p:tgtEl>
+                                          <p:spTgt spid="3">
+                                            <p:txEl>
+                                              <p:pRg st="9" end="9"/>
+                                            </p:txEl>
+                                          </p:spTgt>
+                                        </p:tgtEl>
+                                        <p:attrNameLst>
+                                          <p:attrName>style.visibility</p:attrName>
+                                        </p:attrNameLst>
+                                      </p:cBhvr>
+                                      <p:to>
+                                        <p:strVal val="visible"/>
+                                      </p:to>
+                                    </p:set>
+                                  </p:childTnLst>
+                                </p:cTn>
+                              </p:par>
+                              <p:par>
+                                <p:cTn id="17" presetID="1" presetClass="entr" presetSubtype="0" fill="hold" nodeType="withEffect">
                                   <p:stCondLst>
                                     <p:cond delay="0"/>
                                   </p:stCondLst>
@@ -12769,7 +13082,7 @@
                                         <p:tgtEl>
                                           <p:spTgt spid="3">
                                             <p:txEl>
-                                              <p:pRg st="9" end="9"/>
+                                              <p:pRg st="10" end="10"/>
                                             </p:txEl>
                                           </p:spTgt>
                                         </p:tgtEl>
@@ -12800,7 +13113,7 @@
                                         <p:tgtEl>
                                           <p:spTgt spid="3">
                                             <p:txEl>
-                                              <p:pRg st="10" end="10"/>
+                                              <p:pRg st="11" end="11"/>
                                             </p:txEl>
                                           </p:spTgt>
                                         </p:tgtEl>
@@ -12831,55 +13144,6 @@
                                         <p:tgtEl>
                                           <p:spTgt spid="3">
                                             <p:txEl>
-                                              <p:pRg st="11" end="11"/>
-                                            </p:txEl>
-                                          </p:spTgt>
-                                        </p:tgtEl>
-                                        <p:attrNameLst>
-                                          <p:attrName>style.visibility</p:attrName>
-                                        </p:attrNameLst>
-                                      </p:cBhvr>
-                                      <p:to>
-                                        <p:strVal val="visible"/>
-                                      </p:to>
-                                    </p:set>
-                                  </p:childTnLst>
-                                </p:cTn>
-                              </p:par>
-                            </p:childTnLst>
-                          </p:cTn>
-                        </p:par>
-                      </p:childTnLst>
-                    </p:cTn>
-                  </p:par>
-                  <p:par>
-                    <p:cTn id="23" fill="hold">
-                      <p:stCondLst>
-                        <p:cond delay="indefinite"/>
-                      </p:stCondLst>
-                      <p:childTnLst>
-                        <p:par>
-                          <p:cTn id="24" fill="hold">
-                            <p:stCondLst>
-                              <p:cond delay="0"/>
-                            </p:stCondLst>
-                            <p:childTnLst>
-                              <p:par>
-                                <p:cTn id="25" presetID="1" presetClass="entr" presetSubtype="0" fill="hold" nodeType="clickEffect">
-                                  <p:stCondLst>
-                                    <p:cond delay="0"/>
-                                  </p:stCondLst>
-                                  <p:childTnLst>
-                                    <p:set>
-                                      <p:cBhvr>
-                                        <p:cTn id="26" dur="1" fill="hold">
-                                          <p:stCondLst>
-                                            <p:cond delay="0"/>
-                                          </p:stCondLst>
-                                        </p:cTn>
-                                        <p:tgtEl>
-                                          <p:spTgt spid="3">
-                                            <p:txEl>
                                               <p:pRg st="13" end="13"/>
                                             </p:txEl>
                                           </p:spTgt>
@@ -12896,14 +13160,14 @@
                                 </p:cTn>
                               </p:par>
                               <p:par>
-                                <p:cTn id="27" presetID="1" presetClass="entr" presetSubtype="0" fill="hold" nodeType="withEffect">
+                                <p:cTn id="23" presetID="1" presetClass="entr" presetSubtype="0" fill="hold" nodeType="withEffect">
                                   <p:stCondLst>
                                     <p:cond delay="0"/>
                                   </p:stCondLst>
                                   <p:childTnLst>
                                     <p:set>
                                       <p:cBhvr>
-                                        <p:cTn id="28" dur="1" fill="hold">
+                                        <p:cTn id="24" dur="1" fill="hold">
                                           <p:stCondLst>
                                             <p:cond delay="0"/>
                                           </p:stCondLst>
@@ -12927,7 +13191,56 @@
                                 </p:cTn>
                               </p:par>
                               <p:par>
-                                <p:cTn id="29" presetID="1" presetClass="entr" presetSubtype="0" fill="hold" nodeType="withEffect">
+                                <p:cTn id="25" presetID="1" presetClass="entr" presetSubtype="0" fill="hold" nodeType="withEffect">
+                                  <p:stCondLst>
+                                    <p:cond delay="0"/>
+                                  </p:stCondLst>
+                                  <p:childTnLst>
+                                    <p:set>
+                                      <p:cBhvr>
+                                        <p:cTn id="26" dur="1" fill="hold">
+                                          <p:stCondLst>
+                                            <p:cond delay="0"/>
+                                          </p:stCondLst>
+                                        </p:cTn>
+                                        <p:tgtEl>
+                                          <p:spTgt spid="3">
+                                            <p:txEl>
+                                              <p:pRg st="15" end="15"/>
+                                            </p:txEl>
+                                          </p:spTgt>
+                                        </p:tgtEl>
+                                        <p:attrNameLst>
+                                          <p:attrName>style.visibility</p:attrName>
+                                        </p:attrNameLst>
+                                      </p:cBhvr>
+                                      <p:to>
+                                        <p:strVal val="visible"/>
+                                      </p:to>
+                                    </p:set>
+                                  </p:childTnLst>
+                                </p:cTn>
+                              </p:par>
+                            </p:childTnLst>
+                          </p:cTn>
+                        </p:par>
+                      </p:childTnLst>
+                    </p:cTn>
+                  </p:par>
+                  <p:par>
+                    <p:cTn id="27" fill="hold">
+                      <p:stCondLst>
+                        <p:cond delay="indefinite"/>
+                      </p:stCondLst>
+                      <p:childTnLst>
+                        <p:par>
+                          <p:cTn id="28" fill="hold">
+                            <p:stCondLst>
+                              <p:cond delay="0"/>
+                            </p:stCondLst>
+                            <p:childTnLst>
+                              <p:par>
+                                <p:cTn id="29" presetID="1" presetClass="entr" presetSubtype="0" fill="hold" grpId="0" nodeType="clickEffect">
                                   <p:stCondLst>
                                     <p:cond delay="0"/>
                                   </p:stCondLst>
@@ -12940,11 +13253,214 @@
                                           </p:stCondLst>
                                         </p:cTn>
                                         <p:tgtEl>
-                                          <p:spTgt spid="3">
-                                            <p:txEl>
-                                              <p:pRg st="15" end="15"/>
-                                            </p:txEl>
-                                          </p:spTgt>
+                                          <p:spTgt spid="4"/>
+                                        </p:tgtEl>
+                                        <p:attrNameLst>
+                                          <p:attrName>style.visibility</p:attrName>
+                                        </p:attrNameLst>
+                                      </p:cBhvr>
+                                      <p:to>
+                                        <p:strVal val="visible"/>
+                                      </p:to>
+                                    </p:set>
+                                  </p:childTnLst>
+                                </p:cTn>
+                              </p:par>
+                            </p:childTnLst>
+                          </p:cTn>
+                        </p:par>
+                      </p:childTnLst>
+                    </p:cTn>
+                  </p:par>
+                  <p:par>
+                    <p:cTn id="31" fill="hold">
+                      <p:stCondLst>
+                        <p:cond delay="indefinite"/>
+                      </p:stCondLst>
+                      <p:childTnLst>
+                        <p:par>
+                          <p:cTn id="32" fill="hold">
+                            <p:stCondLst>
+                              <p:cond delay="0"/>
+                            </p:stCondLst>
+                            <p:childTnLst>
+                              <p:par>
+                                <p:cTn id="33" presetID="1" presetClass="entr" presetSubtype="0" fill="hold" grpId="0" nodeType="clickEffect">
+                                  <p:stCondLst>
+                                    <p:cond delay="0"/>
+                                  </p:stCondLst>
+                                  <p:childTnLst>
+                                    <p:set>
+                                      <p:cBhvr>
+                                        <p:cTn id="34" dur="1" fill="hold">
+                                          <p:stCondLst>
+                                            <p:cond delay="0"/>
+                                          </p:stCondLst>
+                                        </p:cTn>
+                                        <p:tgtEl>
+                                          <p:spTgt spid="10"/>
+                                        </p:tgtEl>
+                                        <p:attrNameLst>
+                                          <p:attrName>style.visibility</p:attrName>
+                                        </p:attrNameLst>
+                                      </p:cBhvr>
+                                      <p:to>
+                                        <p:strVal val="visible"/>
+                                      </p:to>
+                                    </p:set>
+                                  </p:childTnLst>
+                                </p:cTn>
+                              </p:par>
+                            </p:childTnLst>
+                          </p:cTn>
+                        </p:par>
+                      </p:childTnLst>
+                    </p:cTn>
+                  </p:par>
+                  <p:par>
+                    <p:cTn id="35" fill="hold">
+                      <p:stCondLst>
+                        <p:cond delay="indefinite"/>
+                      </p:stCondLst>
+                      <p:childTnLst>
+                        <p:par>
+                          <p:cTn id="36" fill="hold">
+                            <p:stCondLst>
+                              <p:cond delay="0"/>
+                            </p:stCondLst>
+                            <p:childTnLst>
+                              <p:par>
+                                <p:cTn id="37" presetID="1" presetClass="entr" presetSubtype="0" fill="hold" grpId="0" nodeType="clickEffect">
+                                  <p:stCondLst>
+                                    <p:cond delay="0"/>
+                                  </p:stCondLst>
+                                  <p:childTnLst>
+                                    <p:set>
+                                      <p:cBhvr>
+                                        <p:cTn id="38" dur="1" fill="hold">
+                                          <p:stCondLst>
+                                            <p:cond delay="0"/>
+                                          </p:stCondLst>
+                                        </p:cTn>
+                                        <p:tgtEl>
+                                          <p:spTgt spid="11"/>
+                                        </p:tgtEl>
+                                        <p:attrNameLst>
+                                          <p:attrName>style.visibility</p:attrName>
+                                        </p:attrNameLst>
+                                      </p:cBhvr>
+                                      <p:to>
+                                        <p:strVal val="visible"/>
+                                      </p:to>
+                                    </p:set>
+                                  </p:childTnLst>
+                                </p:cTn>
+                              </p:par>
+                              <p:par>
+                                <p:cTn id="39" presetID="1" presetClass="entr" presetSubtype="0" fill="hold" grpId="0" nodeType="withEffect">
+                                  <p:stCondLst>
+                                    <p:cond delay="0"/>
+                                  </p:stCondLst>
+                                  <p:childTnLst>
+                                    <p:set>
+                                      <p:cBhvr>
+                                        <p:cTn id="40" dur="1" fill="hold">
+                                          <p:stCondLst>
+                                            <p:cond delay="0"/>
+                                          </p:stCondLst>
+                                        </p:cTn>
+                                        <p:tgtEl>
+                                          <p:spTgt spid="12"/>
+                                        </p:tgtEl>
+                                        <p:attrNameLst>
+                                          <p:attrName>style.visibility</p:attrName>
+                                        </p:attrNameLst>
+                                      </p:cBhvr>
+                                      <p:to>
+                                        <p:strVal val="visible"/>
+                                      </p:to>
+                                    </p:set>
+                                  </p:childTnLst>
+                                </p:cTn>
+                              </p:par>
+                            </p:childTnLst>
+                          </p:cTn>
+                        </p:par>
+                      </p:childTnLst>
+                    </p:cTn>
+                  </p:par>
+                  <p:par>
+                    <p:cTn id="41" fill="hold">
+                      <p:stCondLst>
+                        <p:cond delay="indefinite"/>
+                      </p:stCondLst>
+                      <p:childTnLst>
+                        <p:par>
+                          <p:cTn id="42" fill="hold">
+                            <p:stCondLst>
+                              <p:cond delay="0"/>
+                            </p:stCondLst>
+                            <p:childTnLst>
+                              <p:par>
+                                <p:cTn id="43" presetID="1" presetClass="entr" presetSubtype="0" fill="hold" grpId="0" nodeType="clickEffect">
+                                  <p:stCondLst>
+                                    <p:cond delay="0"/>
+                                  </p:stCondLst>
+                                  <p:childTnLst>
+                                    <p:set>
+                                      <p:cBhvr>
+                                        <p:cTn id="44" dur="1" fill="hold">
+                                          <p:stCondLst>
+                                            <p:cond delay="0"/>
+                                          </p:stCondLst>
+                                        </p:cTn>
+                                        <p:tgtEl>
+                                          <p:spTgt spid="13"/>
+                                        </p:tgtEl>
+                                        <p:attrNameLst>
+                                          <p:attrName>style.visibility</p:attrName>
+                                        </p:attrNameLst>
+                                      </p:cBhvr>
+                                      <p:to>
+                                        <p:strVal val="visible"/>
+                                      </p:to>
+                                    </p:set>
+                                  </p:childTnLst>
+                                </p:cTn>
+                              </p:par>
+                            </p:childTnLst>
+                          </p:cTn>
+                        </p:par>
+                      </p:childTnLst>
+                    </p:cTn>
+                  </p:par>
+                  <p:par>
+                    <p:cTn id="45" fill="hold">
+                      <p:stCondLst>
+                        <p:cond delay="indefinite"/>
+                      </p:stCondLst>
+                      <p:childTnLst>
+                        <p:par>
+                          <p:cTn id="46" fill="hold">
+                            <p:stCondLst>
+                              <p:cond delay="0"/>
+                            </p:stCondLst>
+                            <p:childTnLst>
+                              <p:par>
+                                <p:cTn id="47" presetID="1" presetClass="entr" presetSubtype="0" fill="hold" grpId="0" nodeType="clickEffect">
+                                  <p:stCondLst>
+                                    <p:cond delay="0"/>
+                                  </p:stCondLst>
+                                  <p:childTnLst>
+                                    <p:set>
+                                      <p:cBhvr>
+                                        <p:cTn id="48" dur="1" fill="hold">
+                                          <p:stCondLst>
+                                            <p:cond delay="0"/>
+                                          </p:stCondLst>
+                                        </p:cTn>
+                                        <p:tgtEl>
+                                          <p:spTgt spid="14"/>
                                         </p:tgtEl>
                                         <p:attrNameLst>
                                           <p:attrName>style.visibility</p:attrName>
@@ -12984,6 +13500,14 @@
         </p:cTn>
       </p:par>
     </p:tnLst>
+    <p:bldLst>
+      <p:bldP spid="4" grpId="0"/>
+      <p:bldP spid="10" grpId="0"/>
+      <p:bldP spid="11" grpId="0"/>
+      <p:bldP spid="12" grpId="0"/>
+      <p:bldP spid="13" grpId="0"/>
+      <p:bldP spid="14" grpId="0"/>
+    </p:bldLst>
   </p:timing>
 </p:sld>
 </file>

</xml_diff>

<commit_message>
L21 - Minor update to Admin slide on Ppt.  Changed a couple of variable values - 0x2019!
</commit_message>
<xml_diff>
--- a/notes/L21/Lsn21.pptx
+++ b/notes/L21/Lsn21.pptx
@@ -5,10 +5,10 @@
     <p:sldMasterId id="2147483648" r:id="rId1"/>
   </p:sldMasterIdLst>
   <p:notesMasterIdLst>
-    <p:notesMasterId r:id="rId13"/>
+    <p:notesMasterId r:id="rId12"/>
   </p:notesMasterIdLst>
   <p:handoutMasterIdLst>
-    <p:handoutMasterId r:id="rId14"/>
+    <p:handoutMasterId r:id="rId13"/>
   </p:handoutMasterIdLst>
   <p:sldIdLst>
     <p:sldId id="282" r:id="rId2"/>
@@ -21,7 +21,6 @@
     <p:sldId id="434" r:id="rId9"/>
     <p:sldId id="435" r:id="rId10"/>
     <p:sldId id="436" r:id="rId11"/>
-    <p:sldId id="437" r:id="rId12"/>
   </p:sldIdLst>
   <p:sldSz cx="9144000" cy="6858000" type="screen4x3"/>
   <p:notesSz cx="7315200" cy="9601200"/>
@@ -3927,7 +3926,7 @@
                   <a:srgbClr val="0070C0"/>
                 </a:solidFill>
               </a:rPr>
-              <a:t>due BOC </a:t>
+              <a:t>due </a:t>
             </a:r>
             <a:r>
               <a:rPr lang="en-US" sz="2000" dirty="0" smtClean="0">
@@ -3935,33 +3934,33 @@
                   <a:srgbClr val="0070C0"/>
                 </a:solidFill>
               </a:rPr>
-              <a:t>today</a:t>
-            </a:r>
+              <a:t>next Lesson</a:t>
+            </a:r>
+            <a:endParaRPr lang="en-US" sz="2000" dirty="0" smtClean="0">
+              <a:solidFill>
+                <a:srgbClr val="0070C0"/>
+              </a:solidFill>
+            </a:endParaRPr>
           </a:p>
           <a:p>
             <a:pPr lvl="1" algn="l"/>
             <a:r>
-              <a:rPr lang="en-US" sz="2000" dirty="0" smtClean="0">
-                <a:solidFill>
-                  <a:srgbClr val="0070C0"/>
-                </a:solidFill>
-              </a:rPr>
-              <a:t>Assignment 8 due BOC next Lesson</a:t>
-            </a:r>
-          </a:p>
-          <a:p>
-            <a:pPr lvl="1" algn="l"/>
-            <a:r>
-              <a:rPr lang="en-US" sz="1600" dirty="0" err="1">
+              <a:rPr lang="en-US" sz="1600" dirty="0" err="1" smtClean="0">
                 <a:hlinkClick r:id="rId4"/>
               </a:rPr>
               <a:t>KSplice</a:t>
+            </a:r>
+            <a:r>
+              <a:rPr lang="en-US" sz="1600" dirty="0" smtClean="0">
+                <a:hlinkClick r:id="rId4"/>
+              </a:rPr>
+              <a:t> </a:t>
             </a:r>
             <a:r>
               <a:rPr lang="en-US" sz="1600" dirty="0">
                 <a:hlinkClick r:id="rId4"/>
               </a:rPr>
-              <a:t> pointer </a:t>
+              <a:t>pointer </a:t>
             </a:r>
             <a:r>
               <a:rPr lang="en-US" sz="1600" dirty="0" smtClean="0">
@@ -4277,171 +4276,6 @@
 </p:sld>
 </file>
 
-<file path=ppt/slides/slide11.xml><?xml version="1.0" encoding="utf-8"?>
-<p:sld xmlns:a="http://schemas.openxmlformats.org/drawingml/2006/main" xmlns:r="http://schemas.openxmlformats.org/officeDocument/2006/relationships" xmlns:p="http://schemas.openxmlformats.org/presentationml/2006/main">
-  <p:cSld>
-    <p:spTree>
-      <p:nvGrpSpPr>
-        <p:cNvPr id="1" name=""/>
-        <p:cNvGrpSpPr/>
-        <p:nvPr/>
-      </p:nvGrpSpPr>
-      <p:grpSpPr>
-        <a:xfrm>
-          <a:off x="0" y="0"/>
-          <a:ext cx="0" cy="0"/>
-          <a:chOff x="0" y="0"/>
-          <a:chExt cx="0" cy="0"/>
-        </a:xfrm>
-      </p:grpSpPr>
-      <p:sp>
-        <p:nvSpPr>
-          <p:cNvPr id="2" name="Title 1"/>
-          <p:cNvSpPr>
-            <a:spLocks noGrp="1"/>
-          </p:cNvSpPr>
-          <p:nvPr>
-            <p:ph type="title"/>
-          </p:nvPr>
-        </p:nvSpPr>
-        <p:spPr/>
-        <p:txBody>
-          <a:bodyPr/>
-          <a:lstStyle/>
-          <a:p>
-            <a:r>
-              <a:rPr lang="en-US" b="1" dirty="0" smtClean="0"/>
-              <a:t>Assignment 8</a:t>
-            </a:r>
-            <a:endParaRPr lang="en-US" dirty="0"/>
-          </a:p>
-        </p:txBody>
-      </p:sp>
-      <p:sp>
-        <p:nvSpPr>
-          <p:cNvPr id="3" name="Content Placeholder 2"/>
-          <p:cNvSpPr>
-            <a:spLocks noGrp="1"/>
-          </p:cNvSpPr>
-          <p:nvPr>
-            <p:ph idx="1"/>
-          </p:nvPr>
-        </p:nvSpPr>
-        <p:spPr>
-          <a:xfrm>
-            <a:off x="275129" y="629194"/>
-            <a:ext cx="8868871" cy="5035231"/>
-          </a:xfrm>
-        </p:spPr>
-        <p:txBody>
-          <a:bodyPr/>
-          <a:lstStyle/>
-          <a:p>
-            <a:pPr marL="400050" lvl="1" indent="0">
-              <a:buNone/>
-            </a:pPr>
-            <a:endParaRPr lang="en-US" dirty="0" smtClean="0"/>
-          </a:p>
-          <a:p>
-            <a:pPr marL="400050" lvl="1" indent="0">
-              <a:buNone/>
-            </a:pPr>
-            <a:r>
-              <a:rPr lang="en-US" dirty="0" smtClean="0"/>
-              <a:t>Assignment 8 - Moving Average</a:t>
-            </a:r>
-          </a:p>
-          <a:p>
-            <a:pPr marL="0" indent="0">
-              <a:buNone/>
-            </a:pPr>
-            <a:endParaRPr lang="en-US" sz="1400" b="1" dirty="0">
-              <a:solidFill>
-                <a:schemeClr val="accent2"/>
-              </a:solidFill>
-              <a:latin typeface="Courier New" pitchFamily="49" charset="0"/>
-              <a:cs typeface="Courier New" pitchFamily="49" charset="0"/>
-            </a:endParaRPr>
-          </a:p>
-          <a:p>
-            <a:r>
-              <a:rPr lang="en-US" sz="1400" dirty="0" smtClean="0"/>
-              <a:t>Write </a:t>
-            </a:r>
-            <a:r>
-              <a:rPr lang="en-US" sz="1400" dirty="0"/>
-              <a:t>a function that computes the "moving average" for a stream of data points it is receiving</a:t>
-            </a:r>
-            <a:r>
-              <a:rPr lang="en-US" sz="1400" dirty="0" smtClean="0"/>
-              <a:t>.</a:t>
-            </a:r>
-          </a:p>
-          <a:p>
-            <a:r>
-              <a:rPr lang="en-US" sz="1400" dirty="0"/>
-              <a:t>Write two other functions that compute the maximum and minimum values in a given array. You can "terminate" (last element is some predefined constant to simplify your loop) or pass in the length of the array as a parameter.</a:t>
-            </a:r>
-          </a:p>
-          <a:p>
-            <a:r>
-              <a:rPr lang="en-US" sz="1400" dirty="0"/>
-              <a:t>Write another function that computes the range of values in an array</a:t>
-            </a:r>
-            <a:r>
-              <a:rPr lang="en-US" sz="1400" dirty="0" smtClean="0"/>
-              <a:t>.\</a:t>
-            </a:r>
-          </a:p>
-          <a:p>
-            <a:r>
-              <a:rPr lang="en-US" sz="1400" dirty="0" smtClean="0"/>
-              <a:t>Three separate files: </a:t>
-            </a:r>
-            <a:r>
-              <a:rPr lang="en-US" sz="1400" dirty="0" err="1" smtClean="0"/>
-              <a:t>main.c</a:t>
-            </a:r>
-            <a:r>
-              <a:rPr lang="en-US" sz="1400" dirty="0" smtClean="0"/>
-              <a:t>, header, implementation </a:t>
-            </a:r>
-            <a:endParaRPr lang="en-US" sz="1400" dirty="0"/>
-          </a:p>
-          <a:p>
-            <a:pPr marL="0" indent="0">
-              <a:buNone/>
-            </a:pPr>
-            <a:endParaRPr lang="en-US" sz="1400" b="1" dirty="0" smtClean="0">
-              <a:solidFill>
-                <a:schemeClr val="accent2"/>
-              </a:solidFill>
-              <a:latin typeface="Courier New" pitchFamily="49" charset="0"/>
-              <a:cs typeface="Courier New" pitchFamily="49" charset="0"/>
-            </a:endParaRPr>
-          </a:p>
-        </p:txBody>
-      </p:sp>
-    </p:spTree>
-    <p:extLst>
-      <p:ext uri="{BB962C8B-B14F-4D97-AF65-F5344CB8AC3E}">
-        <p14:creationId xmlns:p14="http://schemas.microsoft.com/office/powerpoint/2010/main" val="4127225423"/>
-      </p:ext>
-    </p:extLst>
-  </p:cSld>
-  <p:clrMapOvr>
-    <a:masterClrMapping/>
-  </p:clrMapOvr>
-  <p:timing>
-    <p:tnLst>
-      <p:par>
-        <p:cTn id="1" dur="indefinite" restart="never" nodeType="tmRoot"/>
-      </p:par>
-    </p:tnLst>
-  </p:timing>
-</p:sld>
-</file>
-
 <file path=ppt/slides/slide2.xml><?xml version="1.0" encoding="utf-8"?>
 <p:sld xmlns:a="http://schemas.openxmlformats.org/drawingml/2006/main" xmlns:r="http://schemas.openxmlformats.org/officeDocument/2006/relationships" xmlns:p="http://schemas.openxmlformats.org/presentationml/2006/main">
   <p:cSld>
@@ -4983,11 +4817,21 @@
                 <a:latin typeface="Courier New" pitchFamily="49" charset="0"/>
                 <a:cs typeface="Courier New" pitchFamily="49" charset="0"/>
               </a:rPr>
-              <a:t> = 0x2006; </a:t>
+              <a:t> = </a:t>
             </a:r>
             <a:r>
               <a:rPr lang="en-US" sz="1400" b="1" dirty="0" smtClean="0">
                 <a:solidFill>
+                  <a:schemeClr val="accent2"/>
+                </a:solidFill>
+                <a:latin typeface="Courier New" pitchFamily="49" charset="0"/>
+                <a:cs typeface="Courier New" pitchFamily="49" charset="0"/>
+              </a:rPr>
+              <a:t>0x2019; </a:t>
+            </a:r>
+            <a:r>
+              <a:rPr lang="en-US" sz="1400" b="1" dirty="0" smtClean="0">
+                <a:solidFill>
                   <a:srgbClr val="00B050"/>
                 </a:solidFill>
                 <a:latin typeface="Courier New" pitchFamily="49" charset="0"/>
@@ -5018,7 +4862,27 @@
                 <a:latin typeface="Courier New" pitchFamily="49" charset="0"/>
                 <a:cs typeface="Courier New" pitchFamily="49" charset="0"/>
               </a:rPr>
-              <a:t> = 0x2006; </a:t>
+              <a:t> = </a:t>
+            </a:r>
+            <a:r>
+              <a:rPr lang="en-US" sz="1400" b="1" dirty="0" smtClean="0">
+                <a:solidFill>
+                  <a:schemeClr val="accent2"/>
+                </a:solidFill>
+                <a:latin typeface="Courier New" pitchFamily="49" charset="0"/>
+                <a:cs typeface="Courier New" pitchFamily="49" charset="0"/>
+              </a:rPr>
+              <a:t>0x0206</a:t>
+            </a:r>
+            <a:r>
+              <a:rPr lang="en-US" sz="1400" b="1" dirty="0" smtClean="0">
+                <a:solidFill>
+                  <a:schemeClr val="accent2"/>
+                </a:solidFill>
+                <a:latin typeface="Courier New" pitchFamily="49" charset="0"/>
+                <a:cs typeface="Courier New" pitchFamily="49" charset="0"/>
+              </a:rPr>
+              <a:t>; </a:t>
             </a:r>
           </a:p>
           <a:p>
@@ -7785,6 +7649,18 @@
             <a:pPr marL="0" indent="0">
               <a:buNone/>
             </a:pPr>
+            <a:endParaRPr lang="en-US" sz="1400" b="1" dirty="0" smtClean="0">
+              <a:solidFill>
+                <a:srgbClr val="00B050"/>
+              </a:solidFill>
+              <a:latin typeface="Courier New" pitchFamily="49" charset="0"/>
+              <a:cs typeface="Courier New" pitchFamily="49" charset="0"/>
+            </a:endParaRPr>
+          </a:p>
+          <a:p>
+            <a:pPr marL="0" indent="0">
+              <a:buNone/>
+            </a:pPr>
             <a:r>
               <a:rPr lang="en-US" sz="1400" b="1" dirty="0" smtClean="0">
                 <a:solidFill>
@@ -7900,6 +7776,18 @@
             <a:endParaRPr lang="en-US" sz="1400" b="1" dirty="0" smtClean="0">
               <a:solidFill>
                 <a:schemeClr val="accent2"/>
+              </a:solidFill>
+              <a:latin typeface="Courier New" pitchFamily="49" charset="0"/>
+              <a:cs typeface="Courier New" pitchFamily="49" charset="0"/>
+            </a:endParaRPr>
+          </a:p>
+          <a:p>
+            <a:pPr marL="0" indent="0">
+              <a:buNone/>
+            </a:pPr>
+            <a:endParaRPr lang="en-US" sz="1400" b="1" dirty="0" smtClean="0">
+              <a:solidFill>
+                <a:srgbClr val="00B050"/>
               </a:solidFill>
               <a:latin typeface="Courier New" pitchFamily="49" charset="0"/>
               <a:cs typeface="Courier New" pitchFamily="49" charset="0"/>
@@ -8453,146 +8341,6 @@
           </a:graphicData>
         </a:graphic>
       </p:graphicFrame>
-      <p:graphicFrame>
-        <p:nvGraphicFramePr>
-          <p:cNvPr id="7" name="Table 6"/>
-          <p:cNvGraphicFramePr>
-            <a:graphicFrameLocks noGrp="1"/>
-          </p:cNvGraphicFramePr>
-          <p:nvPr>
-            <p:extLst>
-              <p:ext uri="{D42A27DB-BD31-4B8C-83A1-F6EECF244321}">
-                <p14:modId xmlns:p14="http://schemas.microsoft.com/office/powerpoint/2010/main" val="939339584"/>
-              </p:ext>
-            </p:extLst>
-          </p:nvPr>
-        </p:nvGraphicFramePr>
-        <p:xfrm>
-          <a:off x="3147800" y="4960418"/>
-          <a:ext cx="2694649" cy="1473200"/>
-        </p:xfrm>
-        <a:graphic>
-          <a:graphicData uri="http://schemas.openxmlformats.org/drawingml/2006/table">
-            <a:tbl>
-              <a:tblPr firstRow="1" bandRow="1">
-                <a:tableStyleId>{21E4AEA4-8DFA-4A89-87EB-49C32662AFE0}</a:tableStyleId>
-              </a:tblPr>
-              <a:tblGrid>
-                <a:gridCol w="1003414"/>
-                <a:gridCol w="1691235"/>
-              </a:tblGrid>
-              <a:tr h="260789">
-                <a:tc>
-                  <a:txBody>
-                    <a:bodyPr/>
-                    <a:lstStyle/>
-                    <a:p>
-                      <a:pPr algn="ctr"/>
-                      <a:r>
-                        <a:rPr lang="en-US" dirty="0" err="1" smtClean="0"/>
-                        <a:t>xPtr</a:t>
-                      </a:r>
-                      <a:endParaRPr lang="en-US" dirty="0"/>
-                    </a:p>
-                  </a:txBody>
-                  <a:tcPr/>
-                </a:tc>
-                <a:tc>
-                  <a:txBody>
-                    <a:bodyPr/>
-                    <a:lstStyle/>
-                    <a:p>
-                      <a:endParaRPr lang="en-US" dirty="0"/>
-                    </a:p>
-                  </a:txBody>
-                  <a:tcPr/>
-                </a:tc>
-              </a:tr>
-              <a:tr h="260789">
-                <a:tc>
-                  <a:txBody>
-                    <a:bodyPr/>
-                    <a:lstStyle/>
-                    <a:p>
-                      <a:pPr algn="ctr"/>
-                      <a:r>
-                        <a:rPr lang="en-US" dirty="0" err="1" smtClean="0"/>
-                        <a:t>yPtr</a:t>
-                      </a:r>
-                      <a:endParaRPr lang="en-US" dirty="0"/>
-                    </a:p>
-                  </a:txBody>
-                  <a:tcPr/>
-                </a:tc>
-                <a:tc>
-                  <a:txBody>
-                    <a:bodyPr/>
-                    <a:lstStyle/>
-                    <a:p>
-                      <a:endParaRPr lang="en-US" dirty="0"/>
-                    </a:p>
-                  </a:txBody>
-                  <a:tcPr/>
-                </a:tc>
-              </a:tr>
-              <a:tr h="370840">
-                <a:tc>
-                  <a:txBody>
-                    <a:bodyPr/>
-                    <a:lstStyle/>
-                    <a:p>
-                      <a:pPr algn="ctr"/>
-                      <a:r>
-                        <a:rPr lang="en-US" dirty="0" smtClean="0"/>
-                        <a:t>x</a:t>
-                      </a:r>
-                      <a:endParaRPr lang="en-US" dirty="0"/>
-                    </a:p>
-                  </a:txBody>
-                  <a:tcPr/>
-                </a:tc>
-                <a:tc>
-                  <a:txBody>
-                    <a:bodyPr/>
-                    <a:lstStyle/>
-                    <a:p>
-                      <a:endParaRPr lang="en-US"/>
-                    </a:p>
-                  </a:txBody>
-                  <a:tcPr/>
-                </a:tc>
-              </a:tr>
-              <a:tr h="370840">
-                <a:tc>
-                  <a:txBody>
-                    <a:bodyPr/>
-                    <a:lstStyle/>
-                    <a:p>
-                      <a:pPr algn="ctr"/>
-                      <a:r>
-                        <a:rPr lang="en-US" dirty="0" smtClean="0"/>
-                        <a:t>y</a:t>
-                      </a:r>
-                      <a:endParaRPr lang="en-US" dirty="0"/>
-                    </a:p>
-                  </a:txBody>
-                  <a:tcPr/>
-                </a:tc>
-                <a:tc>
-                  <a:txBody>
-                    <a:bodyPr/>
-                    <a:lstStyle/>
-                    <a:p>
-                      <a:endParaRPr lang="en-US" dirty="0"/>
-                    </a:p>
-                  </a:txBody>
-                  <a:tcPr/>
-                </a:tc>
-              </a:tr>
-            </a:tbl>
-          </a:graphicData>
-        </a:graphic>
-      </p:graphicFrame>
     </p:spTree>
     <p:extLst>
       <p:ext uri="{BB962C8B-B14F-4D97-AF65-F5344CB8AC3E}">
@@ -8719,7 +8467,7 @@
                                         <p:tgtEl>
                                           <p:spTgt spid="3">
                                             <p:txEl>
-                                              <p:pRg st="11" end="11"/>
+                                              <p:pRg st="12" end="12"/>
                                             </p:txEl>
                                           </p:spTgt>
                                         </p:tgtEl>
@@ -8750,7 +8498,7 @@
                                         <p:tgtEl>
                                           <p:spTgt spid="3">
                                             <p:txEl>
-                                              <p:pRg st="12" end="12"/>
+                                              <p:pRg st="13" end="13"/>
                                             </p:txEl>
                                           </p:spTgt>
                                         </p:tgtEl>
@@ -8799,7 +8547,7 @@
                                         <p:tgtEl>
                                           <p:spTgt spid="3">
                                             <p:txEl>
-                                              <p:pRg st="14" end="14"/>
+                                              <p:pRg st="16" end="16"/>
                                             </p:txEl>
                                           </p:spTgt>
                                         </p:tgtEl>
@@ -8830,7 +8578,7 @@
                                         <p:tgtEl>
                                           <p:spTgt spid="3">
                                             <p:txEl>
-                                              <p:pRg st="15" end="15"/>
+                                              <p:pRg st="17" end="17"/>
                                             </p:txEl>
                                           </p:spTgt>
                                         </p:tgtEl>

</xml_diff>